<commit_message>
03 - project & presentation
</commit_message>
<xml_diff>
--- a/00 Presentations/03 DI, IoT, Services.pptx
+++ b/00 Presentations/03 DI, IoT, Services.pptx
@@ -5,7 +5,7 @@
     <p:sldMasterId id="2147483660" r:id="rId1"/>
   </p:sldMasterIdLst>
   <p:notesMasterIdLst>
-    <p:notesMasterId r:id="rId72"/>
+    <p:notesMasterId r:id="rId90"/>
   </p:notesMasterIdLst>
   <p:sldIdLst>
     <p:sldId id="338" r:id="rId2"/>
@@ -68,51 +68,69 @@
     <p:sldId id="518" r:id="rId59"/>
     <p:sldId id="462" r:id="rId60"/>
     <p:sldId id="519" r:id="rId61"/>
-    <p:sldId id="461" r:id="rId62"/>
-    <p:sldId id="520" r:id="rId63"/>
-    <p:sldId id="459" r:id="rId64"/>
-    <p:sldId id="521" r:id="rId65"/>
-    <p:sldId id="460" r:id="rId66"/>
-    <p:sldId id="522" r:id="rId67"/>
-    <p:sldId id="458" r:id="rId68"/>
-    <p:sldId id="457" r:id="rId69"/>
-    <p:sldId id="475" r:id="rId70"/>
-    <p:sldId id="456" r:id="rId71"/>
+    <p:sldId id="523" r:id="rId62"/>
+    <p:sldId id="524" r:id="rId63"/>
+    <p:sldId id="525" r:id="rId64"/>
+    <p:sldId id="461" r:id="rId65"/>
+    <p:sldId id="520" r:id="rId66"/>
+    <p:sldId id="526" r:id="rId67"/>
+    <p:sldId id="459" r:id="rId68"/>
+    <p:sldId id="521" r:id="rId69"/>
+    <p:sldId id="527" r:id="rId70"/>
+    <p:sldId id="528" r:id="rId71"/>
+    <p:sldId id="529" r:id="rId72"/>
+    <p:sldId id="530" r:id="rId73"/>
+    <p:sldId id="531" r:id="rId74"/>
+    <p:sldId id="460" r:id="rId75"/>
+    <p:sldId id="522" r:id="rId76"/>
+    <p:sldId id="532" r:id="rId77"/>
+    <p:sldId id="458" r:id="rId78"/>
+    <p:sldId id="457" r:id="rId79"/>
+    <p:sldId id="533" r:id="rId80"/>
+    <p:sldId id="534" r:id="rId81"/>
+    <p:sldId id="535" r:id="rId82"/>
+    <p:sldId id="536" r:id="rId83"/>
+    <p:sldId id="537" r:id="rId84"/>
+    <p:sldId id="538" r:id="rId85"/>
+    <p:sldId id="539" r:id="rId86"/>
+    <p:sldId id="540" r:id="rId87"/>
+    <p:sldId id="475" r:id="rId88"/>
+    <p:sldId id="456" r:id="rId89"/>
   </p:sldIdLst>
   <p:sldSz cx="12192000" cy="6858000"/>
   <p:notesSz cx="6858000" cy="9144000"/>
   <p:embeddedFontLst>
     <p:embeddedFont>
       <p:font typeface="Calibri" panose="020F0502020204030204" pitchFamily="34" charset="0"/>
-      <p:regular r:id="rId73"/>
-      <p:bold r:id="rId74"/>
-      <p:italic r:id="rId75"/>
-      <p:boldItalic r:id="rId76"/>
+      <p:regular r:id="rId91"/>
+      <p:bold r:id="rId92"/>
+      <p:italic r:id="rId93"/>
+      <p:boldItalic r:id="rId94"/>
     </p:embeddedFont>
     <p:embeddedFont>
       <p:font typeface="Corbel" panose="020B0503020204020204" pitchFamily="34" charset="0"/>
-      <p:regular r:id="rId77"/>
-      <p:bold r:id="rId78"/>
-      <p:italic r:id="rId79"/>
-      <p:boldItalic r:id="rId80"/>
+      <p:regular r:id="rId95"/>
+      <p:bold r:id="rId96"/>
+      <p:italic r:id="rId97"/>
+      <p:boldItalic r:id="rId98"/>
     </p:embeddedFont>
     <p:embeddedFont>
       <p:font typeface="Lato" panose="020B0604020202020204" charset="0"/>
-      <p:regular r:id="rId81"/>
-      <p:bold r:id="rId82"/>
-      <p:italic r:id="rId83"/>
-      <p:boldItalic r:id="rId84"/>
+      <p:regular r:id="rId99"/>
+      <p:bold r:id="rId100"/>
+      <p:italic r:id="rId101"/>
+      <p:boldItalic r:id="rId102"/>
     </p:embeddedFont>
     <p:embeddedFont>
       <p:font typeface="Montserrat" panose="020B0604020202020204" charset="-52"/>
-      <p:regular r:id="rId85"/>
-      <p:bold r:id="rId86"/>
-      <p:italic r:id="rId87"/>
-      <p:boldItalic r:id="rId88"/>
+      <p:regular r:id="rId103"/>
+      <p:bold r:id="rId104"/>
+      <p:italic r:id="rId105"/>
+      <p:boldItalic r:id="rId106"/>
     </p:embeddedFont>
     <p:embeddedFont>
       <p:font typeface="Wingdings 2" panose="05020102010507070707" pitchFamily="18" charset="2"/>
-      <p:regular r:id="rId89"/>
+      <p:regular r:id="rId107"/>
     </p:embeddedFont>
   </p:embeddedFontLst>
   <p:defaultTextStyle>
@@ -413,14 +431,32 @@
             <p14:sldId id="518"/>
             <p14:sldId id="462"/>
             <p14:sldId id="519"/>
+            <p14:sldId id="523"/>
+            <p14:sldId id="524"/>
+            <p14:sldId id="525"/>
             <p14:sldId id="461"/>
             <p14:sldId id="520"/>
+            <p14:sldId id="526"/>
             <p14:sldId id="459"/>
             <p14:sldId id="521"/>
+            <p14:sldId id="527"/>
+            <p14:sldId id="528"/>
+            <p14:sldId id="529"/>
+            <p14:sldId id="530"/>
+            <p14:sldId id="531"/>
             <p14:sldId id="460"/>
             <p14:sldId id="522"/>
+            <p14:sldId id="532"/>
             <p14:sldId id="458"/>
             <p14:sldId id="457"/>
+            <p14:sldId id="533"/>
+            <p14:sldId id="534"/>
+            <p14:sldId id="535"/>
+            <p14:sldId id="536"/>
+            <p14:sldId id="537"/>
+            <p14:sldId id="538"/>
+            <p14:sldId id="539"/>
+            <p14:sldId id="540"/>
             <p14:sldId id="475"/>
           </p14:sldIdLst>
         </p14:section>
@@ -2055,7 +2091,7 @@
             <a:fld id="{1ACF989F-2540-4A1F-95BB-19F8DB837FED}" type="slidenum">
               <a:rPr lang="en-US"/>
               <a:pPr/>
-              <a:t>67</a:t>
+              <a:t>77</a:t>
             </a:fld>
             <a:r>
               <a:rPr lang="en-US" dirty="0"/>
@@ -3063,7 +3099,7 @@
             <a:fld id="{1ACF989F-2540-4A1F-95BB-19F8DB837FED}" type="slidenum">
               <a:rPr lang="en-US"/>
               <a:pPr/>
-              <a:t>61</a:t>
+              <a:t>64</a:t>
             </a:fld>
             <a:r>
               <a:rPr lang="en-US" dirty="0"/>
@@ -3231,7 +3267,7 @@
             <a:fld id="{1ACF989F-2540-4A1F-95BB-19F8DB837FED}" type="slidenum">
               <a:rPr lang="en-US"/>
               <a:pPr/>
-              <a:t>63</a:t>
+              <a:t>67</a:t>
             </a:fld>
             <a:r>
               <a:rPr lang="en-US" dirty="0"/>
@@ -3399,7 +3435,7 @@
             <a:fld id="{1ACF989F-2540-4A1F-95BB-19F8DB837FED}" type="slidenum">
               <a:rPr lang="en-US"/>
               <a:pPr/>
-              <a:t>65</a:t>
+              <a:t>74</a:t>
             </a:fld>
             <a:r>
               <a:rPr lang="en-US" dirty="0"/>
@@ -19901,7 +19937,11 @@
           <a:bodyPr/>
           <a:lstStyle/>
           <a:p>
-            <a:endParaRPr lang="bg-BG"/>
+            <a:r>
+              <a:rPr lang="en-US" dirty="0"/>
+              <a:t>ASP.NET Core - Middleware</a:t>
+            </a:r>
+            <a:endParaRPr lang="bg-BG" dirty="0"/>
           </a:p>
         </p:txBody>
       </p:sp>
@@ -19921,21 +19961,89 @@
             <p:ph type="body" idx="1"/>
           </p:nvPr>
         </p:nvSpPr>
-        <p:spPr/>
+        <p:spPr>
+          <a:xfrm>
+            <a:off x="1730000" y="1465634"/>
+            <a:ext cx="9385200" cy="4928681"/>
+          </a:xfrm>
+        </p:spPr>
         <p:txBody>
           <a:bodyPr/>
           <a:lstStyle/>
           <a:p>
             <a:r>
-              <a:rPr lang="en-US" dirty="0">
-                <a:hlinkClick r:id="rId2"/>
-              </a:rPr>
-              <a:t>https://www.tutorialsteacher.com/core/aspnet-core-middleware</a:t>
-            </a:r>
-            <a:r>
-              <a:rPr lang="bg-BG" dirty="0"/>
-              <a:t> </a:t>
-            </a:r>
+              <a:rPr lang="en-US" dirty="0"/>
+              <a:t>ASP.NET Core introduced a new concept called Middleware. </a:t>
+            </a:r>
+          </a:p>
+          <a:p>
+            <a:endParaRPr lang="en-US" dirty="0"/>
+          </a:p>
+          <a:p>
+            <a:r>
+              <a:rPr lang="en-US" dirty="0"/>
+              <a:t>A middleware is nothing but a component (class) which is executed on every request in ASP.NET Core application. </a:t>
+            </a:r>
+          </a:p>
+          <a:p>
+            <a:endParaRPr lang="en-US" dirty="0"/>
+          </a:p>
+          <a:p>
+            <a:r>
+              <a:rPr lang="en-US" dirty="0"/>
+              <a:t>In the classic ASP.NET, </a:t>
+            </a:r>
+            <a:r>
+              <a:rPr lang="en-US" dirty="0" err="1"/>
+              <a:t>HttpHandlers</a:t>
+            </a:r>
+            <a:r>
+              <a:rPr lang="en-US" dirty="0"/>
+              <a:t> and </a:t>
+            </a:r>
+            <a:r>
+              <a:rPr lang="en-US" dirty="0" err="1"/>
+              <a:t>HttpModules</a:t>
+            </a:r>
+            <a:r>
+              <a:rPr lang="en-US" dirty="0"/>
+              <a:t> were part of request pipeline. Middleware is similar to </a:t>
+            </a:r>
+            <a:r>
+              <a:rPr lang="en-US" dirty="0" err="1"/>
+              <a:t>HttpHandlers</a:t>
+            </a:r>
+            <a:r>
+              <a:rPr lang="en-US" dirty="0"/>
+              <a:t> and </a:t>
+            </a:r>
+            <a:r>
+              <a:rPr lang="en-US" dirty="0" err="1"/>
+              <a:t>HttpModules</a:t>
+            </a:r>
+            <a:r>
+              <a:rPr lang="en-US" dirty="0"/>
+              <a:t> where both needs to be configured and executed in each request.</a:t>
+            </a:r>
+          </a:p>
+          <a:p>
+            <a:endParaRPr lang="en-US" dirty="0"/>
+          </a:p>
+          <a:p>
+            <a:r>
+              <a:rPr lang="en-US" dirty="0"/>
+              <a:t>Typically, there will be multiple middleware in ASP.NET Core web application. It can be either framework provided middleware, added via NuGet or your own custom middleware. We can set the order of middleware execution in the request pipeline. </a:t>
+            </a:r>
+          </a:p>
+          <a:p>
+            <a:endParaRPr lang="en-US" dirty="0"/>
+          </a:p>
+          <a:p>
+            <a:r>
+              <a:rPr lang="en-US" dirty="0"/>
+              <a:t>Each middleware adds or modifies http request and optionally passes control to the next middleware component. The following figure illustrates the execution of middleware components.</a:t>
+            </a:r>
+            <a:endParaRPr lang="bg-BG" dirty="0"/>
           </a:p>
         </p:txBody>
       </p:sp>
@@ -19971,66 +20079,179 @@
       </p:grpSpPr>
       <p:sp>
         <p:nvSpPr>
-          <p:cNvPr id="474114" name="Rectangle 2"/>
+          <p:cNvPr id="2" name="Title 1">
+            <a:extLst>
+              <a:ext uri="{FF2B5EF4-FFF2-40B4-BE49-F238E27FC236}">
+                <a16:creationId xmlns:a16="http://schemas.microsoft.com/office/drawing/2014/main" id="{2FC32A5B-1FD3-4FCD-9911-56C1C9D30FCA}"/>
+              </a:ext>
+            </a:extLst>
+          </p:cNvPr>
           <p:cNvSpPr>
-            <a:spLocks noGrp="1" noChangeArrowheads="1"/>
-          </p:cNvSpPr>
-          <p:nvPr>
-            <p:ph type="ctrTitle"/>
+            <a:spLocks noGrp="1"/>
+          </p:cNvSpPr>
+          <p:nvPr>
+            <p:ph type="title"/>
+          </p:nvPr>
+        </p:nvSpPr>
+        <p:spPr/>
+        <p:txBody>
+          <a:bodyPr/>
+          <a:lstStyle/>
+          <a:p>
+            <a:r>
+              <a:rPr lang="en-US" dirty="0"/>
+              <a:t>ASP.NET Core - Middleware</a:t>
+            </a:r>
+            <a:endParaRPr lang="bg-BG" dirty="0"/>
+          </a:p>
+        </p:txBody>
+      </p:sp>
+      <p:sp>
+        <p:nvSpPr>
+          <p:cNvPr id="3" name="Text Placeholder 2">
+            <a:extLst>
+              <a:ext uri="{FF2B5EF4-FFF2-40B4-BE49-F238E27FC236}">
+                <a16:creationId xmlns:a16="http://schemas.microsoft.com/office/drawing/2014/main" id="{77D118EC-DFFA-4086-9692-77B8477A69A2}"/>
+              </a:ext>
+            </a:extLst>
+          </p:cNvPr>
+          <p:cNvSpPr>
+            <a:spLocks noGrp="1"/>
+          </p:cNvSpPr>
+          <p:nvPr>
+            <p:ph type="body" idx="1"/>
           </p:nvPr>
         </p:nvSpPr>
         <p:spPr>
           <a:xfrm>
-            <a:off x="3947404" y="2299009"/>
-            <a:ext cx="7978708" cy="1339136"/>
+            <a:off x="1730000" y="5481733"/>
+            <a:ext cx="9385200" cy="490033"/>
           </a:xfrm>
         </p:spPr>
         <p:txBody>
           <a:bodyPr/>
           <a:lstStyle/>
           <a:p>
-            <a:pPr>
-              <a:spcBef>
-                <a:spcPts val="300"/>
-              </a:spcBef>
-              <a:spcAft>
-                <a:spcPts val="300"/>
-              </a:spcAft>
+            <a:pPr marL="120650" indent="0">
+              <a:buNone/>
             </a:pPr>
             <a:r>
-              <a:rPr lang="fr-FR" sz="4800" dirty="0"/>
-              <a:t>ASP.NET </a:t>
-            </a:r>
-            <a:r>
-              <a:rPr lang="fr-FR" sz="4800" dirty="0" err="1"/>
-              <a:t>Core</a:t>
-            </a:r>
-            <a:r>
-              <a:rPr lang="fr-FR" sz="4800" dirty="0"/>
-              <a:t> - </a:t>
-            </a:r>
-            <a:r>
-              <a:rPr lang="fr-FR" sz="4800" dirty="0" err="1"/>
-              <a:t>Environment</a:t>
-            </a:r>
-            <a:r>
-              <a:rPr lang="fr-FR" sz="4800" dirty="0"/>
-              <a:t> Variable</a:t>
-            </a:r>
-          </a:p>
-        </p:txBody>
-      </p:sp>
+              <a:rPr lang="en-US" dirty="0">
+                <a:hlinkClick r:id="rId2"/>
+              </a:rPr>
+              <a:t>https://www.tutorialsteacher.com/core/aspnet-core-middleware</a:t>
+            </a:r>
+            <a:r>
+              <a:rPr lang="bg-BG" dirty="0"/>
+              <a:t> </a:t>
+            </a:r>
+          </a:p>
+        </p:txBody>
+      </p:sp>
+      <p:pic>
+        <p:nvPicPr>
+          <p:cNvPr id="1026" name="Picture 2">
+            <a:extLst>
+              <a:ext uri="{FF2B5EF4-FFF2-40B4-BE49-F238E27FC236}">
+                <a16:creationId xmlns:a16="http://schemas.microsoft.com/office/drawing/2014/main" id="{7F240ED4-A9E4-499C-A870-1C84098704C3}"/>
+              </a:ext>
+            </a:extLst>
+          </p:cNvPr>
+          <p:cNvPicPr>
+            <a:picLocks noChangeAspect="1" noChangeArrowheads="1"/>
+          </p:cNvPicPr>
+          <p:nvPr/>
+        </p:nvPicPr>
+        <p:blipFill>
+          <a:blip r:embed="rId3">
+            <a:extLst>
+              <a:ext uri="{28A0092B-C50C-407E-A947-70E740481C1C}">
+                <a14:useLocalDpi xmlns:a14="http://schemas.microsoft.com/office/drawing/2010/main" val="0"/>
+              </a:ext>
+            </a:extLst>
+          </a:blip>
+          <a:srcRect/>
+          <a:stretch>
+            <a:fillRect/>
+          </a:stretch>
+        </p:blipFill>
+        <p:spPr bwMode="auto">
+          <a:xfrm>
+            <a:off x="1730000" y="1573246"/>
+            <a:ext cx="5734050" cy="2038350"/>
+          </a:xfrm>
+          <a:prstGeom prst="rect">
+            <a:avLst/>
+          </a:prstGeom>
+          <a:noFill/>
+          <a:extLst>
+            <a:ext uri="{909E8E84-426E-40DD-AFC4-6F175D3DCCD1}">
+              <a14:hiddenFill xmlns:a14="http://schemas.microsoft.com/office/drawing/2010/main">
+                <a:solidFill>
+                  <a:srgbClr val="FFFFFF"/>
+                </a:solidFill>
+              </a14:hiddenFill>
+            </a:ext>
+          </a:extLst>
+        </p:spPr>
+      </p:pic>
+      <p:pic>
+        <p:nvPicPr>
+          <p:cNvPr id="1028" name="Picture 4">
+            <a:extLst>
+              <a:ext uri="{FF2B5EF4-FFF2-40B4-BE49-F238E27FC236}">
+                <a16:creationId xmlns:a16="http://schemas.microsoft.com/office/drawing/2014/main" id="{6143B6AA-3D09-41A6-8121-3A8A7DAA13C6}"/>
+              </a:ext>
+            </a:extLst>
+          </p:cNvPr>
+          <p:cNvPicPr>
+            <a:picLocks noChangeAspect="1" noChangeArrowheads="1"/>
+          </p:cNvPicPr>
+          <p:nvPr/>
+        </p:nvPicPr>
+        <p:blipFill>
+          <a:blip r:embed="rId4">
+            <a:extLst>
+              <a:ext uri="{28A0092B-C50C-407E-A947-70E740481C1C}">
+                <a14:useLocalDpi xmlns:a14="http://schemas.microsoft.com/office/drawing/2010/main" val="0"/>
+              </a:ext>
+            </a:extLst>
+          </a:blip>
+          <a:srcRect/>
+          <a:stretch>
+            <a:fillRect/>
+          </a:stretch>
+        </p:blipFill>
+        <p:spPr bwMode="auto">
+          <a:xfrm>
+            <a:off x="1730000" y="3860865"/>
+            <a:ext cx="9496425" cy="1371600"/>
+          </a:xfrm>
+          <a:prstGeom prst="rect">
+            <a:avLst/>
+          </a:prstGeom>
+          <a:noFill/>
+          <a:extLst>
+            <a:ext uri="{909E8E84-426E-40DD-AFC4-6F175D3DCCD1}">
+              <a14:hiddenFill xmlns:a14="http://schemas.microsoft.com/office/drawing/2010/main">
+                <a:solidFill>
+                  <a:srgbClr val="FFFFFF"/>
+                </a:solidFill>
+              </a14:hiddenFill>
+            </a:ext>
+          </a:extLst>
+        </p:spPr>
+      </p:pic>
     </p:spTree>
     <p:extLst>
       <p:ext uri="{BB962C8B-B14F-4D97-AF65-F5344CB8AC3E}">
-        <p14:creationId xmlns:p14="http://schemas.microsoft.com/office/powerpoint/2010/main" val="3267685328"/>
+        <p14:creationId xmlns:p14="http://schemas.microsoft.com/office/powerpoint/2010/main" val="2879148824"/>
       </p:ext>
     </p:extLst>
   </p:cSld>
   <p:clrMapOvr>
     <a:masterClrMapping/>
   </p:clrMapOvr>
-  <p:transition/>
 </p:sld>
 </file>
 
@@ -20056,7 +20277,7 @@
           <p:cNvPr id="2" name="Title 1">
             <a:extLst>
               <a:ext uri="{FF2B5EF4-FFF2-40B4-BE49-F238E27FC236}">
-                <a16:creationId xmlns:a16="http://schemas.microsoft.com/office/drawing/2014/main" id="{4B740D13-D36C-47B1-B9FD-5934F6E06E3C}"/>
+                <a16:creationId xmlns:a16="http://schemas.microsoft.com/office/drawing/2014/main" id="{19F3F7C6-2E63-4329-848A-21891545AECC}"/>
               </a:ext>
             </a:extLst>
           </p:cNvPr>
@@ -20072,7 +20293,11 @@
           <a:bodyPr/>
           <a:lstStyle/>
           <a:p>
-            <a:endParaRPr lang="bg-BG"/>
+            <a:r>
+              <a:rPr lang="en-US" dirty="0"/>
+              <a:t>Configure the Default File to be Served on the Root Request</a:t>
+            </a:r>
+            <a:endParaRPr lang="bg-BG" dirty="0"/>
           </a:p>
         </p:txBody>
       </p:sp>
@@ -20081,7 +20306,7 @@
           <p:cNvPr id="3" name="Text Placeholder 2">
             <a:extLst>
               <a:ext uri="{FF2B5EF4-FFF2-40B4-BE49-F238E27FC236}">
-                <a16:creationId xmlns:a16="http://schemas.microsoft.com/office/drawing/2014/main" id="{45CEA562-F8A8-4E7E-8A37-2982C2F079F1}"/>
+                <a16:creationId xmlns:a16="http://schemas.microsoft.com/office/drawing/2014/main" id="{2C80D323-25C1-4C78-AB72-2AAA47956F69}"/>
               </a:ext>
             </a:extLst>
           </p:cNvPr>
@@ -20098,22 +20323,74 @@
           <a:lstStyle/>
           <a:p>
             <a:r>
+              <a:rPr lang="en-US" dirty="0"/>
+              <a:t>As we learned in the Set Default File section, </a:t>
+            </a:r>
+            <a:r>
+              <a:rPr lang="en-US" dirty="0" err="1">
+                <a:solidFill>
+                  <a:schemeClr val="accent1">
+                    <a:lumMod val="60000"/>
+                    <a:lumOff val="40000"/>
+                  </a:schemeClr>
+                </a:solidFill>
+              </a:rPr>
+              <a:t>app.UseDefaultFiles</a:t>
+            </a:r>
+            <a:r>
               <a:rPr lang="en-US" dirty="0">
-                <a:hlinkClick r:id="rId2"/>
+                <a:solidFill>
+                  <a:schemeClr val="accent1">
+                    <a:lumMod val="60000"/>
+                    <a:lumOff val="40000"/>
+                  </a:schemeClr>
+                </a:solidFill>
               </a:rPr>
-              <a:t>https://www.tutorialsteacher.com/core/aspnet-core-environment-variable</a:t>
-            </a:r>
-            <a:r>
-              <a:rPr lang="bg-BG" dirty="0"/>
-              <a:t> </a:t>
-            </a:r>
+              <a:t>()</a:t>
+            </a:r>
+            <a:r>
+              <a:rPr lang="en-US" dirty="0"/>
+              <a:t> middleware serves the following files on the root request.</a:t>
+            </a:r>
+          </a:p>
+          <a:p>
+            <a:endParaRPr lang="en-US" dirty="0"/>
+          </a:p>
+          <a:p>
+            <a:pPr lvl="1"/>
+            <a:r>
+              <a:rPr lang="en-US" dirty="0"/>
+              <a:t>Default.html</a:t>
+            </a:r>
+          </a:p>
+          <a:p>
+            <a:pPr lvl="1"/>
+            <a:r>
+              <a:rPr lang="en-US" dirty="0"/>
+              <a:t>Default.htm</a:t>
+            </a:r>
+          </a:p>
+          <a:p>
+            <a:pPr lvl="1"/>
+            <a:r>
+              <a:rPr lang="en-US" dirty="0"/>
+              <a:t>Index.html</a:t>
+            </a:r>
+          </a:p>
+          <a:p>
+            <a:pPr lvl="1"/>
+            <a:r>
+              <a:rPr lang="en-US" dirty="0"/>
+              <a:t>Index.htm</a:t>
+            </a:r>
+            <a:endParaRPr lang="bg-BG" dirty="0"/>
           </a:p>
         </p:txBody>
       </p:sp>
     </p:spTree>
     <p:extLst>
       <p:ext uri="{BB962C8B-B14F-4D97-AF65-F5344CB8AC3E}">
-        <p14:creationId xmlns:p14="http://schemas.microsoft.com/office/powerpoint/2010/main" val="3300640313"/>
+        <p14:creationId xmlns:p14="http://schemas.microsoft.com/office/powerpoint/2010/main" val="363687493"/>
       </p:ext>
     </p:extLst>
   </p:cSld>
@@ -20142,50 +20419,183 @@
       </p:grpSpPr>
       <p:sp>
         <p:nvSpPr>
-          <p:cNvPr id="474114" name="Rectangle 2"/>
+          <p:cNvPr id="2" name="Title 1">
+            <a:extLst>
+              <a:ext uri="{FF2B5EF4-FFF2-40B4-BE49-F238E27FC236}">
+                <a16:creationId xmlns:a16="http://schemas.microsoft.com/office/drawing/2014/main" id="{C128A475-FDC5-47E5-90B5-E840A0E98AA3}"/>
+              </a:ext>
+            </a:extLst>
+          </p:cNvPr>
           <p:cNvSpPr>
-            <a:spLocks noGrp="1" noChangeArrowheads="1"/>
-          </p:cNvSpPr>
-          <p:nvPr>
-            <p:ph type="ctrTitle"/>
+            <a:spLocks noGrp="1"/>
+          </p:cNvSpPr>
+          <p:nvPr>
+            <p:ph type="title"/>
+          </p:nvPr>
+        </p:nvSpPr>
+        <p:spPr/>
+        <p:txBody>
+          <a:bodyPr/>
+          <a:lstStyle/>
+          <a:p>
+            <a:r>
+              <a:rPr lang="en-US" dirty="0"/>
+              <a:t>Configure the Default File to be Served on the Root Request</a:t>
+            </a:r>
+            <a:endParaRPr lang="bg-BG" dirty="0"/>
+          </a:p>
+        </p:txBody>
+      </p:sp>
+      <p:sp>
+        <p:nvSpPr>
+          <p:cNvPr id="3" name="Text Placeholder 2">
+            <a:extLst>
+              <a:ext uri="{FF2B5EF4-FFF2-40B4-BE49-F238E27FC236}">
+                <a16:creationId xmlns:a16="http://schemas.microsoft.com/office/drawing/2014/main" id="{4EC92396-6E2D-4D0C-8C11-86BDADBF01EF}"/>
+              </a:ext>
+            </a:extLst>
+          </p:cNvPr>
+          <p:cNvSpPr>
+            <a:spLocks noGrp="1"/>
+          </p:cNvSpPr>
+          <p:nvPr>
+            <p:ph type="body" idx="1"/>
           </p:nvPr>
         </p:nvSpPr>
         <p:spPr>
           <a:xfrm>
-            <a:off x="3947404" y="2299009"/>
-            <a:ext cx="7978708" cy="1339136"/>
+            <a:off x="1729999" y="1835285"/>
+            <a:ext cx="9988587" cy="4844375"/>
           </a:xfrm>
         </p:spPr>
         <p:txBody>
           <a:bodyPr/>
           <a:lstStyle/>
           <a:p>
-            <a:pPr>
-              <a:spcBef>
-                <a:spcPts val="300"/>
-              </a:spcBef>
-              <a:spcAft>
-                <a:spcPts val="300"/>
-              </a:spcAft>
-            </a:pPr>
-            <a:r>
-              <a:rPr lang="en-US" sz="4800" dirty="0"/>
-              <a:t>ASP.NET Core - Exception Handling</a:t>
-            </a:r>
-          </a:p>
-        </p:txBody>
-      </p:sp>
+            <a:r>
+              <a:rPr lang="en-US" dirty="0"/>
+              <a:t>Suppose, you want to set home.html as a default page which should be displayed on the root access. To do that, specify </a:t>
+            </a:r>
+            <a:r>
+              <a:rPr lang="en-US" dirty="0" err="1"/>
+              <a:t>DefaultFilesOptions</a:t>
+            </a:r>
+            <a:r>
+              <a:rPr lang="en-US" dirty="0"/>
+              <a:t> in the </a:t>
+            </a:r>
+            <a:r>
+              <a:rPr lang="en-US" dirty="0" err="1"/>
+              <a:t>UseDefaultFiles</a:t>
+            </a:r>
+            <a:r>
+              <a:rPr lang="en-US" dirty="0"/>
+              <a:t> method as shown below.</a:t>
+            </a:r>
+          </a:p>
+          <a:p>
+            <a:endParaRPr lang="en-US" dirty="0"/>
+          </a:p>
+          <a:p>
+            <a:endParaRPr lang="en-US" dirty="0"/>
+          </a:p>
+          <a:p>
+            <a:endParaRPr lang="en-US" dirty="0"/>
+          </a:p>
+          <a:p>
+            <a:endParaRPr lang="en-US" dirty="0"/>
+          </a:p>
+          <a:p>
+            <a:endParaRPr lang="en-US" dirty="0"/>
+          </a:p>
+          <a:p>
+            <a:endParaRPr lang="en-US" dirty="0"/>
+          </a:p>
+          <a:p>
+            <a:endParaRPr lang="en-US" dirty="0"/>
+          </a:p>
+          <a:p>
+            <a:endParaRPr lang="en-US" dirty="0"/>
+          </a:p>
+          <a:p>
+            <a:endParaRPr lang="en-US" dirty="0"/>
+          </a:p>
+          <a:p>
+            <a:endParaRPr lang="en-US" dirty="0"/>
+          </a:p>
+          <a:p>
+            <a:r>
+              <a:rPr lang="en-US" dirty="0"/>
+              <a:t>Now, this will display home.html from </a:t>
+            </a:r>
+            <a:r>
+              <a:rPr lang="en-US" dirty="0" err="1"/>
+              <a:t>wwwroot</a:t>
+            </a:r>
+            <a:r>
+              <a:rPr lang="en-US" dirty="0"/>
+              <a:t> folder on the root request </a:t>
+            </a:r>
+            <a:r>
+              <a:rPr lang="en-US" dirty="0">
+                <a:hlinkClick r:id="rId2"/>
+              </a:rPr>
+              <a:t>http://localhost:&lt;port</a:t>
+            </a:r>
+            <a:r>
+              <a:rPr lang="en-US" dirty="0"/>
+              <a:t>&gt;.</a:t>
+            </a:r>
+          </a:p>
+          <a:p>
+            <a:r>
+              <a:rPr lang="en-US" dirty="0"/>
+              <a:t>Most middleware's has an ability to be configured using options.</a:t>
+            </a:r>
+            <a:endParaRPr lang="bg-BG" dirty="0"/>
+          </a:p>
+        </p:txBody>
+      </p:sp>
+      <p:pic>
+        <p:nvPicPr>
+          <p:cNvPr id="5" name="Picture 4">
+            <a:extLst>
+              <a:ext uri="{FF2B5EF4-FFF2-40B4-BE49-F238E27FC236}">
+                <a16:creationId xmlns:a16="http://schemas.microsoft.com/office/drawing/2014/main" id="{7548E419-8CC2-4EA6-9DC7-55BFC667373C}"/>
+              </a:ext>
+            </a:extLst>
+          </p:cNvPr>
+          <p:cNvPicPr>
+            <a:picLocks noChangeAspect="1"/>
+          </p:cNvPicPr>
+          <p:nvPr/>
+        </p:nvPicPr>
+        <p:blipFill>
+          <a:blip r:embed="rId3"/>
+          <a:stretch>
+            <a:fillRect/>
+          </a:stretch>
+        </p:blipFill>
+        <p:spPr>
+          <a:xfrm>
+            <a:off x="2272469" y="2727634"/>
+            <a:ext cx="4451823" cy="2612595"/>
+          </a:xfrm>
+          <a:prstGeom prst="rect">
+            <a:avLst/>
+          </a:prstGeom>
+        </p:spPr>
+      </p:pic>
     </p:spTree>
     <p:extLst>
       <p:ext uri="{BB962C8B-B14F-4D97-AF65-F5344CB8AC3E}">
-        <p14:creationId xmlns:p14="http://schemas.microsoft.com/office/powerpoint/2010/main" val="1133172360"/>
+        <p14:creationId xmlns:p14="http://schemas.microsoft.com/office/powerpoint/2010/main" val="172724973"/>
       </p:ext>
     </p:extLst>
   </p:cSld>
   <p:clrMapOvr>
     <a:masterClrMapping/>
   </p:clrMapOvr>
-  <p:transition/>
 </p:sld>
 </file>
 
@@ -20208,59 +20618,51 @@
       </p:grpSpPr>
       <p:sp>
         <p:nvSpPr>
-          <p:cNvPr id="2" name="Title 1">
-            <a:extLst>
-              <a:ext uri="{FF2B5EF4-FFF2-40B4-BE49-F238E27FC236}">
-                <a16:creationId xmlns:a16="http://schemas.microsoft.com/office/drawing/2014/main" id="{80FFFFC1-4CA5-49FA-9527-39F7E971636D}"/>
-              </a:ext>
-            </a:extLst>
-          </p:cNvPr>
+          <p:cNvPr id="474114" name="Rectangle 2"/>
           <p:cNvSpPr>
-            <a:spLocks noGrp="1"/>
-          </p:cNvSpPr>
-          <p:nvPr>
-            <p:ph type="title"/>
-          </p:nvPr>
-        </p:nvSpPr>
-        <p:spPr/>
+            <a:spLocks noGrp="1" noChangeArrowheads="1"/>
+          </p:cNvSpPr>
+          <p:nvPr>
+            <p:ph type="ctrTitle"/>
+          </p:nvPr>
+        </p:nvSpPr>
+        <p:spPr>
+          <a:xfrm>
+            <a:off x="3947404" y="2299009"/>
+            <a:ext cx="7978708" cy="1339136"/>
+          </a:xfrm>
+        </p:spPr>
         <p:txBody>
           <a:bodyPr/>
           <a:lstStyle/>
           <a:p>
-            <a:endParaRPr lang="bg-BG"/>
-          </a:p>
-        </p:txBody>
-      </p:sp>
-      <p:sp>
-        <p:nvSpPr>
-          <p:cNvPr id="3" name="Text Placeholder 2">
-            <a:extLst>
-              <a:ext uri="{FF2B5EF4-FFF2-40B4-BE49-F238E27FC236}">
-                <a16:creationId xmlns:a16="http://schemas.microsoft.com/office/drawing/2014/main" id="{7FE906EB-CA7B-40C3-8D84-734CE2C517E3}"/>
-              </a:ext>
-            </a:extLst>
-          </p:cNvPr>
-          <p:cNvSpPr>
-            <a:spLocks noGrp="1"/>
-          </p:cNvSpPr>
-          <p:nvPr>
-            <p:ph type="body" idx="1"/>
-          </p:nvPr>
-        </p:nvSpPr>
-        <p:spPr/>
-        <p:txBody>
-          <a:bodyPr/>
-          <a:lstStyle/>
-          <a:p>
-            <a:r>
-              <a:rPr lang="en-US" dirty="0">
-                <a:hlinkClick r:id="rId2"/>
-              </a:rPr>
-              <a:t>https://www.tutorialsteacher.com/core/aspnet-core-exception-handling</a:t>
-            </a:r>
-            <a:r>
-              <a:rPr lang="bg-BG" dirty="0"/>
-              <a:t> </a:t>
+            <a:pPr>
+              <a:spcBef>
+                <a:spcPts val="300"/>
+              </a:spcBef>
+              <a:spcAft>
+                <a:spcPts val="300"/>
+              </a:spcAft>
+            </a:pPr>
+            <a:r>
+              <a:rPr lang="fr-FR" sz="4800" dirty="0"/>
+              <a:t>ASP.NET </a:t>
+            </a:r>
+            <a:r>
+              <a:rPr lang="fr-FR" sz="4800" dirty="0" err="1"/>
+              <a:t>Core</a:t>
+            </a:r>
+            <a:r>
+              <a:rPr lang="fr-FR" sz="4800" dirty="0"/>
+              <a:t> - </a:t>
+            </a:r>
+            <a:r>
+              <a:rPr lang="fr-FR" sz="4800" dirty="0" err="1"/>
+              <a:t>Environment</a:t>
+            </a:r>
+            <a:r>
+              <a:rPr lang="fr-FR" sz="4800" dirty="0"/>
+              <a:t> Variable</a:t>
             </a:r>
           </a:p>
         </p:txBody>
@@ -20268,13 +20670,14 @@
     </p:spTree>
     <p:extLst>
       <p:ext uri="{BB962C8B-B14F-4D97-AF65-F5344CB8AC3E}">
-        <p14:creationId xmlns:p14="http://schemas.microsoft.com/office/powerpoint/2010/main" val="2083500077"/>
+        <p14:creationId xmlns:p14="http://schemas.microsoft.com/office/powerpoint/2010/main" val="3267685328"/>
       </p:ext>
     </p:extLst>
   </p:cSld>
   <p:clrMapOvr>
     <a:masterClrMapping/>
   </p:clrMapOvr>
+  <p:transition/>
 </p:sld>
 </file>
 
@@ -20297,57 +20700,129 @@
       </p:grpSpPr>
       <p:sp>
         <p:nvSpPr>
-          <p:cNvPr id="474114" name="Rectangle 2"/>
+          <p:cNvPr id="2" name="Title 1">
+            <a:extLst>
+              <a:ext uri="{FF2B5EF4-FFF2-40B4-BE49-F238E27FC236}">
+                <a16:creationId xmlns:a16="http://schemas.microsoft.com/office/drawing/2014/main" id="{4B740D13-D36C-47B1-B9FD-5934F6E06E3C}"/>
+              </a:ext>
+            </a:extLst>
+          </p:cNvPr>
           <p:cNvSpPr>
-            <a:spLocks noGrp="1" noChangeArrowheads="1"/>
-          </p:cNvSpPr>
-          <p:nvPr>
-            <p:ph type="ctrTitle"/>
+            <a:spLocks noGrp="1"/>
+          </p:cNvSpPr>
+          <p:nvPr>
+            <p:ph type="title"/>
+          </p:nvPr>
+        </p:nvSpPr>
+        <p:spPr/>
+        <p:txBody>
+          <a:bodyPr/>
+          <a:lstStyle/>
+          <a:p>
+            <a:r>
+              <a:rPr lang="fr-FR" dirty="0"/>
+              <a:t>ASP.NET </a:t>
+            </a:r>
+            <a:r>
+              <a:rPr lang="fr-FR" dirty="0" err="1"/>
+              <a:t>Core</a:t>
+            </a:r>
+            <a:r>
+              <a:rPr lang="fr-FR" dirty="0"/>
+              <a:t> - </a:t>
+            </a:r>
+            <a:r>
+              <a:rPr lang="fr-FR" dirty="0" err="1"/>
+              <a:t>Environment</a:t>
+            </a:r>
+            <a:r>
+              <a:rPr lang="fr-FR" dirty="0"/>
+              <a:t> Variable</a:t>
+            </a:r>
+            <a:endParaRPr lang="bg-BG" dirty="0"/>
+          </a:p>
+        </p:txBody>
+      </p:sp>
+      <p:sp>
+        <p:nvSpPr>
+          <p:cNvPr id="3" name="Text Placeholder 2">
+            <a:extLst>
+              <a:ext uri="{FF2B5EF4-FFF2-40B4-BE49-F238E27FC236}">
+                <a16:creationId xmlns:a16="http://schemas.microsoft.com/office/drawing/2014/main" id="{45CEA562-F8A8-4E7E-8A37-2982C2F079F1}"/>
+              </a:ext>
+            </a:extLst>
+          </p:cNvPr>
+          <p:cNvSpPr>
+            <a:spLocks noGrp="1"/>
+          </p:cNvSpPr>
+          <p:nvPr>
+            <p:ph type="body" idx="1"/>
           </p:nvPr>
         </p:nvSpPr>
         <p:spPr>
           <a:xfrm>
-            <a:off x="4319080" y="2299009"/>
-            <a:ext cx="7607031" cy="1339136"/>
+            <a:off x="1730000" y="1433209"/>
+            <a:ext cx="9385200" cy="5064868"/>
           </a:xfrm>
         </p:spPr>
         <p:txBody>
           <a:bodyPr/>
           <a:lstStyle/>
           <a:p>
-            <a:pPr>
-              <a:spcBef>
-                <a:spcPts val="300"/>
-              </a:spcBef>
-              <a:spcAft>
-                <a:spcPts val="300"/>
-              </a:spcAft>
-            </a:pPr>
-            <a:r>
-              <a:rPr lang="en-US" sz="4800" dirty="0"/>
-              <a:t>ASP.NET Core – </a:t>
-            </a:r>
-            <a:br>
-              <a:rPr lang="en-US" sz="4800" dirty="0"/>
-            </a:br>
-            <a:r>
-              <a:rPr lang="en-US" sz="4800" dirty="0"/>
-              <a:t>Static files</a:t>
-            </a:r>
+            <a:r>
+              <a:rPr lang="en-US" dirty="0"/>
+              <a:t>Typically, in professional application development, there are multiple phases where an application is tested before publishing it to the real users. </a:t>
+            </a:r>
+          </a:p>
+          <a:p>
+            <a:endParaRPr lang="en-US" dirty="0"/>
+          </a:p>
+          <a:p>
+            <a:r>
+              <a:rPr lang="en-US" dirty="0"/>
+              <a:t>These phases by convention are development, staging, and production. </a:t>
+            </a:r>
+          </a:p>
+          <a:p>
+            <a:endParaRPr lang="en-US" dirty="0"/>
+          </a:p>
+          <a:p>
+            <a:r>
+              <a:rPr lang="en-US" dirty="0"/>
+              <a:t>We as developers might like to control the behavior of an application based on the phases the application is in. </a:t>
+            </a:r>
+          </a:p>
+          <a:p>
+            <a:endParaRPr lang="en-US" dirty="0"/>
+          </a:p>
+          <a:p>
+            <a:r>
+              <a:rPr lang="en-US" dirty="0"/>
+              <a:t>Environment variable indicates the runtime environment in which an application is currently running.</a:t>
+            </a:r>
+          </a:p>
+          <a:p>
+            <a:endParaRPr lang="en-US" dirty="0"/>
+          </a:p>
+          <a:p>
+            <a:r>
+              <a:rPr lang="en-US" dirty="0"/>
+              <a:t>ASP.NET Core uses an environment variable called ASPNETCORE ENVIRONMENT to indicate the runtime environment. The value of this variable can be anything as per your need but typically it can be Development, Staging, or Production. The value is case insensitive in Windows and Mac OS but it is case sensitive on Linux.</a:t>
+            </a:r>
+            <a:endParaRPr lang="bg-BG" dirty="0"/>
           </a:p>
         </p:txBody>
       </p:sp>
     </p:spTree>
     <p:extLst>
       <p:ext uri="{BB962C8B-B14F-4D97-AF65-F5344CB8AC3E}">
-        <p14:creationId xmlns:p14="http://schemas.microsoft.com/office/powerpoint/2010/main" val="1809884173"/>
+        <p14:creationId xmlns:p14="http://schemas.microsoft.com/office/powerpoint/2010/main" val="3300640313"/>
       </p:ext>
     </p:extLst>
   </p:cSld>
   <p:clrMapOvr>
     <a:masterClrMapping/>
   </p:clrMapOvr>
-  <p:transition/>
 </p:sld>
 </file>
 
@@ -20373,7 +20848,7 @@
           <p:cNvPr id="2" name="Title 1">
             <a:extLst>
               <a:ext uri="{FF2B5EF4-FFF2-40B4-BE49-F238E27FC236}">
-                <a16:creationId xmlns:a16="http://schemas.microsoft.com/office/drawing/2014/main" id="{9659C768-5FCF-495C-AA0C-E551F227C61A}"/>
+                <a16:creationId xmlns:a16="http://schemas.microsoft.com/office/drawing/2014/main" id="{63328A3A-3954-4CF4-AB03-EE366DA1EFCC}"/>
               </a:ext>
             </a:extLst>
           </p:cNvPr>
@@ -20389,48 +20864,175 @@
           <a:bodyPr/>
           <a:lstStyle/>
           <a:p>
-            <a:endParaRPr lang="bg-BG"/>
-          </a:p>
-        </p:txBody>
-      </p:sp>
-      <p:sp>
-        <p:nvSpPr>
-          <p:cNvPr id="3" name="Text Placeholder 2">
+            <a:r>
+              <a:rPr lang="fr-FR" dirty="0"/>
+              <a:t>ASP.NET </a:t>
+            </a:r>
+            <a:r>
+              <a:rPr lang="fr-FR" dirty="0" err="1"/>
+              <a:t>Core</a:t>
+            </a:r>
+            <a:r>
+              <a:rPr lang="fr-FR" dirty="0"/>
+              <a:t> - </a:t>
+            </a:r>
+            <a:r>
+              <a:rPr lang="fr-FR" dirty="0" err="1"/>
+              <a:t>Environment</a:t>
+            </a:r>
+            <a:r>
+              <a:rPr lang="fr-FR" dirty="0"/>
+              <a:t> Variable</a:t>
+            </a:r>
+            <a:endParaRPr lang="bg-BG" dirty="0"/>
+          </a:p>
+        </p:txBody>
+      </p:sp>
+      <p:pic>
+        <p:nvPicPr>
+          <p:cNvPr id="3076" name="Picture 4">
             <a:extLst>
               <a:ext uri="{FF2B5EF4-FFF2-40B4-BE49-F238E27FC236}">
-                <a16:creationId xmlns:a16="http://schemas.microsoft.com/office/drawing/2014/main" id="{4DD3A575-5E79-478A-8483-E486A79C2841}"/>
+                <a16:creationId xmlns:a16="http://schemas.microsoft.com/office/drawing/2014/main" id="{D7C1C0FF-FF35-401D-94CA-46430454D7D6}"/>
               </a:ext>
             </a:extLst>
           </p:cNvPr>
-          <p:cNvSpPr>
-            <a:spLocks noGrp="1"/>
-          </p:cNvSpPr>
-          <p:nvPr>
-            <p:ph type="body" idx="1"/>
-          </p:nvPr>
-        </p:nvSpPr>
-        <p:spPr/>
-        <p:txBody>
-          <a:bodyPr/>
-          <a:lstStyle/>
-          <a:p>
-            <a:r>
-              <a:rPr lang="en-US" dirty="0">
-                <a:hlinkClick r:id="rId2"/>
-              </a:rPr>
-              <a:t>https://www.tutorialsteacher.com/core/aspnet-core-static-file</a:t>
-            </a:r>
-            <a:r>
-              <a:rPr lang="bg-BG" dirty="0"/>
-              <a:t> </a:t>
-            </a:r>
-          </a:p>
-        </p:txBody>
-      </p:sp>
+          <p:cNvPicPr>
+            <a:picLocks noChangeAspect="1" noChangeArrowheads="1"/>
+          </p:cNvPicPr>
+          <p:nvPr/>
+        </p:nvPicPr>
+        <p:blipFill>
+          <a:blip r:embed="rId2">
+            <a:extLst>
+              <a:ext uri="{28A0092B-C50C-407E-A947-70E740481C1C}">
+                <a14:useLocalDpi xmlns:a14="http://schemas.microsoft.com/office/drawing/2010/main" val="0"/>
+              </a:ext>
+            </a:extLst>
+          </a:blip>
+          <a:srcRect/>
+          <a:stretch>
+            <a:fillRect/>
+          </a:stretch>
+        </p:blipFill>
+        <p:spPr bwMode="auto">
+          <a:xfrm>
+            <a:off x="2710733" y="1672714"/>
+            <a:ext cx="4216428" cy="2475586"/>
+          </a:xfrm>
+          <a:prstGeom prst="rect">
+            <a:avLst/>
+          </a:prstGeom>
+          <a:noFill/>
+          <a:extLst>
+            <a:ext uri="{909E8E84-426E-40DD-AFC4-6F175D3DCCD1}">
+              <a14:hiddenFill xmlns:a14="http://schemas.microsoft.com/office/drawing/2010/main">
+                <a:solidFill>
+                  <a:srgbClr val="FFFFFF"/>
+                </a:solidFill>
+              </a14:hiddenFill>
+            </a:ext>
+          </a:extLst>
+        </p:spPr>
+      </p:pic>
+      <p:pic>
+        <p:nvPicPr>
+          <p:cNvPr id="3078" name="Picture 6" descr="launchsettings.json">
+            <a:extLst>
+              <a:ext uri="{FF2B5EF4-FFF2-40B4-BE49-F238E27FC236}">
+                <a16:creationId xmlns:a16="http://schemas.microsoft.com/office/drawing/2014/main" id="{31AA374E-CB5A-4760-92C7-AA9C5E76D5CF}"/>
+              </a:ext>
+            </a:extLst>
+          </p:cNvPr>
+          <p:cNvPicPr>
+            <a:picLocks noChangeAspect="1" noChangeArrowheads="1"/>
+          </p:cNvPicPr>
+          <p:nvPr/>
+        </p:nvPicPr>
+        <p:blipFill>
+          <a:blip r:embed="rId3">
+            <a:extLst>
+              <a:ext uri="{28A0092B-C50C-407E-A947-70E740481C1C}">
+                <a14:useLocalDpi xmlns:a14="http://schemas.microsoft.com/office/drawing/2010/main" val="0"/>
+              </a:ext>
+            </a:extLst>
+          </a:blip>
+          <a:srcRect/>
+          <a:stretch>
+            <a:fillRect/>
+          </a:stretch>
+        </p:blipFill>
+        <p:spPr bwMode="auto">
+          <a:xfrm>
+            <a:off x="7164887" y="3826212"/>
+            <a:ext cx="5027113" cy="2953966"/>
+          </a:xfrm>
+          <a:prstGeom prst="rect">
+            <a:avLst/>
+          </a:prstGeom>
+          <a:noFill/>
+          <a:extLst>
+            <a:ext uri="{909E8E84-426E-40DD-AFC4-6F175D3DCCD1}">
+              <a14:hiddenFill xmlns:a14="http://schemas.microsoft.com/office/drawing/2010/main">
+                <a:solidFill>
+                  <a:srgbClr val="FFFFFF"/>
+                </a:solidFill>
+              </a14:hiddenFill>
+            </a:ext>
+          </a:extLst>
+        </p:spPr>
+      </p:pic>
+      <p:pic>
+        <p:nvPicPr>
+          <p:cNvPr id="3074" name="Picture 2" descr="open Project Properties">
+            <a:extLst>
+              <a:ext uri="{FF2B5EF4-FFF2-40B4-BE49-F238E27FC236}">
+                <a16:creationId xmlns:a16="http://schemas.microsoft.com/office/drawing/2014/main" id="{24729B26-9414-4BCE-B6BE-01ADDB0FE813}"/>
+              </a:ext>
+            </a:extLst>
+          </p:cNvPr>
+          <p:cNvPicPr>
+            <a:picLocks noChangeAspect="1" noChangeArrowheads="1"/>
+          </p:cNvPicPr>
+          <p:nvPr/>
+        </p:nvPicPr>
+        <p:blipFill>
+          <a:blip r:embed="rId4">
+            <a:extLst>
+              <a:ext uri="{28A0092B-C50C-407E-A947-70E740481C1C}">
+                <a14:useLocalDpi xmlns:a14="http://schemas.microsoft.com/office/drawing/2010/main" val="0"/>
+              </a:ext>
+            </a:extLst>
+          </a:blip>
+          <a:srcRect/>
+          <a:stretch>
+            <a:fillRect/>
+          </a:stretch>
+        </p:blipFill>
+        <p:spPr bwMode="auto">
+          <a:xfrm>
+            <a:off x="128314" y="3257856"/>
+            <a:ext cx="3203371" cy="3260882"/>
+          </a:xfrm>
+          <a:prstGeom prst="rect">
+            <a:avLst/>
+          </a:prstGeom>
+          <a:noFill/>
+          <a:extLst>
+            <a:ext uri="{909E8E84-426E-40DD-AFC4-6F175D3DCCD1}">
+              <a14:hiddenFill xmlns:a14="http://schemas.microsoft.com/office/drawing/2010/main">
+                <a:solidFill>
+                  <a:srgbClr val="FFFFFF"/>
+                </a:solidFill>
+              </a14:hiddenFill>
+            </a:ext>
+          </a:extLst>
+        </p:spPr>
+      </p:pic>
     </p:spTree>
     <p:extLst>
       <p:ext uri="{BB962C8B-B14F-4D97-AF65-F5344CB8AC3E}">
-        <p14:creationId xmlns:p14="http://schemas.microsoft.com/office/powerpoint/2010/main" val="3414867192"/>
+        <p14:creationId xmlns:p14="http://schemas.microsoft.com/office/powerpoint/2010/main" val="3253862134"/>
       </p:ext>
     </p:extLst>
   </p:cSld>
@@ -20487,7 +21089,7 @@
             </a:pPr>
             <a:r>
               <a:rPr lang="en-US" sz="4800" dirty="0"/>
-              <a:t>Logging in ASP.NET Core</a:t>
+              <a:t>ASP.NET Core - Exception Handling</a:t>
             </a:r>
           </a:p>
         </p:txBody>
@@ -20495,7 +21097,7 @@
     </p:spTree>
     <p:extLst>
       <p:ext uri="{BB962C8B-B14F-4D97-AF65-F5344CB8AC3E}">
-        <p14:creationId xmlns:p14="http://schemas.microsoft.com/office/powerpoint/2010/main" val="2420581427"/>
+        <p14:creationId xmlns:p14="http://schemas.microsoft.com/office/powerpoint/2010/main" val="1133172360"/>
       </p:ext>
     </p:extLst>
   </p:cSld>
@@ -20528,7 +21130,7 @@
           <p:cNvPr id="2" name="Title 1">
             <a:extLst>
               <a:ext uri="{FF2B5EF4-FFF2-40B4-BE49-F238E27FC236}">
-                <a16:creationId xmlns:a16="http://schemas.microsoft.com/office/drawing/2014/main" id="{E78E8862-C04B-4216-A1A7-450391CDCE6E}"/>
+                <a16:creationId xmlns:a16="http://schemas.microsoft.com/office/drawing/2014/main" id="{80FFFFC1-4CA5-49FA-9527-39F7E971636D}"/>
               </a:ext>
             </a:extLst>
           </p:cNvPr>
@@ -20544,7 +21146,11 @@
           <a:bodyPr/>
           <a:lstStyle/>
           <a:p>
-            <a:endParaRPr lang="bg-BG"/>
+            <a:r>
+              <a:rPr lang="en-US" dirty="0"/>
+              <a:t>ASP.NET Core - Exception Handling</a:t>
+            </a:r>
+            <a:endParaRPr lang="bg-BG" dirty="0"/>
           </a:p>
         </p:txBody>
       </p:sp>
@@ -20553,7 +21159,7 @@
           <p:cNvPr id="3" name="Text Placeholder 2">
             <a:extLst>
               <a:ext uri="{FF2B5EF4-FFF2-40B4-BE49-F238E27FC236}">
-                <a16:creationId xmlns:a16="http://schemas.microsoft.com/office/drawing/2014/main" id="{AC5BB2FB-2481-4F50-A2B0-5C54F8CA0825}"/>
+                <a16:creationId xmlns:a16="http://schemas.microsoft.com/office/drawing/2014/main" id="{7FE906EB-CA7B-40C3-8D84-734CE2C517E3}"/>
               </a:ext>
             </a:extLst>
           </p:cNvPr>
@@ -20564,28 +21170,67 @@
             <p:ph type="body" idx="1"/>
           </p:nvPr>
         </p:nvSpPr>
-        <p:spPr/>
+        <p:spPr>
+          <a:xfrm>
+            <a:off x="1730000" y="1841770"/>
+            <a:ext cx="9385200" cy="4129997"/>
+          </a:xfrm>
+        </p:spPr>
         <p:txBody>
           <a:bodyPr/>
           <a:lstStyle/>
           <a:p>
             <a:r>
-              <a:rPr lang="en-US" dirty="0">
-                <a:hlinkClick r:id="rId2"/>
-              </a:rPr>
-              <a:t>https://www.tutorialsteacher.com/core/fundamentals-of-logging-in-dotnet-core</a:t>
-            </a:r>
-            <a:r>
-              <a:rPr lang="bg-BG" dirty="0"/>
-              <a:t> </a:t>
-            </a:r>
-          </a:p>
-        </p:txBody>
-      </p:sp>
+              <a:rPr lang="en-US" dirty="0"/>
+              <a:t>Exception handling is one of the most important features of any application. Fortunately, ASP.NET Core includes a middleware that makes exception handling easy. In this chapter, we will learn about exception handling in ASP.NET Core application.</a:t>
+            </a:r>
+          </a:p>
+          <a:p>
+            <a:endParaRPr lang="en-US" dirty="0"/>
+          </a:p>
+          <a:p>
+            <a:r>
+              <a:rPr lang="en-US" dirty="0"/>
+              <a:t>By default, ASP.NET Core returns a simple status code for any exception that occurs in an application. Consider the following example of Configure method which throws an error.</a:t>
+            </a:r>
+            <a:endParaRPr lang="bg-BG" dirty="0"/>
+          </a:p>
+        </p:txBody>
+      </p:sp>
+      <p:pic>
+        <p:nvPicPr>
+          <p:cNvPr id="5" name="Picture 4">
+            <a:extLst>
+              <a:ext uri="{FF2B5EF4-FFF2-40B4-BE49-F238E27FC236}">
+                <a16:creationId xmlns:a16="http://schemas.microsoft.com/office/drawing/2014/main" id="{62A1D556-7FEF-47A8-8DD4-C93E78ED8384}"/>
+              </a:ext>
+            </a:extLst>
+          </p:cNvPr>
+          <p:cNvPicPr>
+            <a:picLocks noChangeAspect="1"/>
+          </p:cNvPicPr>
+          <p:nvPr/>
+        </p:nvPicPr>
+        <p:blipFill>
+          <a:blip r:embed="rId2"/>
+          <a:stretch>
+            <a:fillRect/>
+          </a:stretch>
+        </p:blipFill>
+        <p:spPr>
+          <a:xfrm>
+            <a:off x="2306671" y="3964424"/>
+            <a:ext cx="5825852" cy="1483065"/>
+          </a:xfrm>
+          <a:prstGeom prst="rect">
+            <a:avLst/>
+          </a:prstGeom>
+        </p:spPr>
+      </p:pic>
     </p:spTree>
     <p:extLst>
       <p:ext uri="{BB962C8B-B14F-4D97-AF65-F5344CB8AC3E}">
-        <p14:creationId xmlns:p14="http://schemas.microsoft.com/office/powerpoint/2010/main" val="3142235865"/>
+        <p14:creationId xmlns:p14="http://schemas.microsoft.com/office/powerpoint/2010/main" val="2083500077"/>
       </p:ext>
     </p:extLst>
   </p:cSld>
@@ -20617,7 +21262,7 @@
           <p:cNvPr id="2" name="Title 1">
             <a:extLst>
               <a:ext uri="{FF2B5EF4-FFF2-40B4-BE49-F238E27FC236}">
-                <a16:creationId xmlns:a16="http://schemas.microsoft.com/office/drawing/2014/main" id="{10E0DAA9-0199-494C-9E89-ACFF7424F028}"/>
+                <a16:creationId xmlns:a16="http://schemas.microsoft.com/office/drawing/2014/main" id="{83E3CBA6-ECAF-4BB2-8DF3-6243A7E5120F}"/>
               </a:ext>
             </a:extLst>
           </p:cNvPr>
@@ -20635,11 +21280,8 @@
           <a:p>
             <a:r>
               <a:rPr lang="en-US" dirty="0"/>
-              <a:t>References</a:t>
-            </a:r>
-            <a:br>
-              <a:rPr lang="en-US" dirty="0"/>
-            </a:br>
+              <a:t>ASP.NET Core - Exception Handling</a:t>
+            </a:r>
             <a:endParaRPr lang="bg-BG" dirty="0"/>
           </a:p>
         </p:txBody>
@@ -20649,7 +21291,7 @@
           <p:cNvPr id="3" name="Text Placeholder 2">
             <a:extLst>
               <a:ext uri="{FF2B5EF4-FFF2-40B4-BE49-F238E27FC236}">
-                <a16:creationId xmlns:a16="http://schemas.microsoft.com/office/drawing/2014/main" id="{E14B88FA-6628-4ECF-83D0-32C8AB046F2F}"/>
+                <a16:creationId xmlns:a16="http://schemas.microsoft.com/office/drawing/2014/main" id="{F956B022-58C8-4955-A64B-6C8B75142302}"/>
               </a:ext>
             </a:extLst>
           </p:cNvPr>
@@ -20666,59 +21308,64 @@
           <a:lstStyle/>
           <a:p>
             <a:r>
-              <a:rPr lang="en-US" dirty="0">
-                <a:hlinkClick r:id="rId2"/>
-              </a:rPr>
-              <a:t>https://www.tutorialsteacher.com/core</a:t>
-            </a:r>
-            <a:endParaRPr lang="en-US" dirty="0"/>
-          </a:p>
-          <a:p>
-            <a:endParaRPr lang="en-US" dirty="0"/>
-          </a:p>
-          <a:p>
-            <a:r>
-              <a:rPr lang="en-US" dirty="0">
-                <a:hlinkClick r:id="rId3"/>
-              </a:rPr>
-              <a:t>https://www.tutorialsteacher.com/ioc</a:t>
-            </a:r>
-            <a:endParaRPr lang="en-US" dirty="0"/>
-          </a:p>
-          <a:p>
-            <a:endParaRPr lang="en-US" dirty="0"/>
-          </a:p>
-          <a:p>
-            <a:r>
-              <a:rPr lang="en-US" dirty="0">
-                <a:hlinkClick r:id="rId4"/>
-              </a:rPr>
-              <a:t>https://www.tutorialspoint.com/asp.net_core/index.htm</a:t>
-            </a:r>
-            <a:endParaRPr lang="en-US" dirty="0"/>
-          </a:p>
-          <a:p>
-            <a:endParaRPr lang="en-US" dirty="0"/>
-          </a:p>
-          <a:p>
-            <a:r>
-              <a:rPr lang="en-US" dirty="0">
-                <a:hlinkClick r:id="rId5"/>
-              </a:rPr>
-              <a:t>https://docs.microsoft.com/en-us/aspnet/core/tutorials/first-mvc-app/start-mvc</a:t>
-            </a:r>
-            <a:r>
-              <a:rPr lang="en-US" dirty="0"/>
-              <a:t> </a:t>
+              <a:rPr lang="en-US" dirty="0"/>
+              <a:t>The above code will display the following result.</a:t>
             </a:r>
             <a:endParaRPr lang="bg-BG" dirty="0"/>
           </a:p>
         </p:txBody>
       </p:sp>
+      <p:pic>
+        <p:nvPicPr>
+          <p:cNvPr id="4098" name="Picture 2" descr="exception handling asp.net core">
+            <a:extLst>
+              <a:ext uri="{FF2B5EF4-FFF2-40B4-BE49-F238E27FC236}">
+                <a16:creationId xmlns:a16="http://schemas.microsoft.com/office/drawing/2014/main" id="{494C125C-09F3-4F38-BB7D-F9C920B23EBF}"/>
+              </a:ext>
+            </a:extLst>
+          </p:cNvPr>
+          <p:cNvPicPr>
+            <a:picLocks noChangeAspect="1" noChangeArrowheads="1"/>
+          </p:cNvPicPr>
+          <p:nvPr/>
+        </p:nvPicPr>
+        <p:blipFill>
+          <a:blip r:embed="rId2">
+            <a:extLst>
+              <a:ext uri="{28A0092B-C50C-407E-A947-70E740481C1C}">
+                <a14:useLocalDpi xmlns:a14="http://schemas.microsoft.com/office/drawing/2010/main" val="0"/>
+              </a:ext>
+            </a:extLst>
+          </a:blip>
+          <a:srcRect/>
+          <a:stretch>
+            <a:fillRect/>
+          </a:stretch>
+        </p:blipFill>
+        <p:spPr bwMode="auto">
+          <a:xfrm>
+            <a:off x="2296843" y="2620693"/>
+            <a:ext cx="4292025" cy="2555285"/>
+          </a:xfrm>
+          <a:prstGeom prst="rect">
+            <a:avLst/>
+          </a:prstGeom>
+          <a:noFill/>
+          <a:extLst>
+            <a:ext uri="{909E8E84-426E-40DD-AFC4-6F175D3DCCD1}">
+              <a14:hiddenFill xmlns:a14="http://schemas.microsoft.com/office/drawing/2010/main">
+                <a:solidFill>
+                  <a:srgbClr val="FFFFFF"/>
+                </a:solidFill>
+              </a14:hiddenFill>
+            </a:ext>
+          </a:extLst>
+        </p:spPr>
+      </p:pic>
     </p:spTree>
     <p:extLst>
       <p:ext uri="{BB962C8B-B14F-4D97-AF65-F5344CB8AC3E}">
-        <p14:creationId xmlns:p14="http://schemas.microsoft.com/office/powerpoint/2010/main" val="2545040170"/>
+        <p14:creationId xmlns:p14="http://schemas.microsoft.com/office/powerpoint/2010/main" val="3644491026"/>
       </p:ext>
     </p:extLst>
   </p:cSld>
@@ -20890,7 +21537,7 @@
           <p:cNvPr id="2" name="Title 1">
             <a:extLst>
               <a:ext uri="{FF2B5EF4-FFF2-40B4-BE49-F238E27FC236}">
-                <a16:creationId xmlns:a16="http://schemas.microsoft.com/office/drawing/2014/main" id="{047A5BB5-3F10-4F03-9744-321F834641BA}"/>
+                <a16:creationId xmlns:a16="http://schemas.microsoft.com/office/drawing/2014/main" id="{561DCFD0-3704-4B7E-92B7-E28E42BCC0FD}"/>
               </a:ext>
             </a:extLst>
           </p:cNvPr>
@@ -20907,8 +21554,12 @@
           <a:lstStyle/>
           <a:p>
             <a:r>
-              <a:rPr lang="en-US" dirty="0"/>
-              <a:t>Homework</a:t>
+              <a:rPr lang="en-US" dirty="0" err="1"/>
+              <a:t>Microsoft.AspNetCore.Diagnostics</a:t>
+            </a:r>
+            <a:r>
+              <a:rPr lang="en-US" dirty="0"/>
+              <a:t> Package</a:t>
             </a:r>
             <a:endParaRPr lang="bg-BG" dirty="0"/>
           </a:p>
@@ -20919,7 +21570,7 @@
           <p:cNvPr id="3" name="Text Placeholder 2">
             <a:extLst>
               <a:ext uri="{FF2B5EF4-FFF2-40B4-BE49-F238E27FC236}">
-                <a16:creationId xmlns:a16="http://schemas.microsoft.com/office/drawing/2014/main" id="{3A1E41A4-8588-44BC-B023-FD2650C44621}"/>
+                <a16:creationId xmlns:a16="http://schemas.microsoft.com/office/drawing/2014/main" id="{ED74EF6B-1C13-4F8B-B6AD-42FF13B83D94}"/>
               </a:ext>
             </a:extLst>
           </p:cNvPr>
@@ -20930,132 +21581,1397 @@
             <p:ph type="body" idx="1"/>
           </p:nvPr>
         </p:nvSpPr>
-        <p:spPr>
-          <a:xfrm>
-            <a:off x="1730000" y="1446179"/>
-            <a:ext cx="9385200" cy="5181600"/>
-          </a:xfrm>
-        </p:spPr>
+        <p:spPr/>
         <p:txBody>
           <a:bodyPr/>
           <a:lstStyle/>
           <a:p>
             <a:r>
               <a:rPr lang="en-US" dirty="0"/>
-              <a:t>Create new ASP.NET Core MVC web project using the default template</a:t>
+              <a:t>To handle exceptions and display user friendly messages, we need to install </a:t>
+            </a:r>
+            <a:r>
+              <a:rPr lang="en-US" dirty="0" err="1"/>
+              <a:t>Microsoft.AspNetCore.Diagnostics</a:t>
+            </a:r>
+            <a:r>
+              <a:rPr lang="en-US" dirty="0"/>
+              <a:t> NuGet package and add middleware in the Configure() method. If you are using Visual Studio templates to create ASP.NET Core application then this package might be already installed. If not then you can add </a:t>
+            </a:r>
+            <a:r>
+              <a:rPr lang="en-US" dirty="0" err="1"/>
+              <a:t>Microsoft.AspNetCore.Diagnostics</a:t>
+            </a:r>
+            <a:r>
+              <a:rPr lang="en-US" dirty="0"/>
+              <a:t> package via NuGet manager.</a:t>
+            </a:r>
+          </a:p>
+          <a:p>
+            <a:endParaRPr lang="en-US" dirty="0"/>
+          </a:p>
+          <a:p>
+            <a:r>
+              <a:rPr lang="en-US" dirty="0"/>
+              <a:t>The </a:t>
+            </a:r>
+            <a:r>
+              <a:rPr lang="en-US" dirty="0" err="1"/>
+              <a:t>Microsoft.AspNetCore.Diagnostics</a:t>
+            </a:r>
+            <a:r>
+              <a:rPr lang="en-US" dirty="0"/>
+              <a:t> package includes following extension methods to handle exceptions in different scenario:</a:t>
+            </a:r>
+          </a:p>
+          <a:p>
+            <a:endParaRPr lang="en-US" dirty="0"/>
+          </a:p>
+          <a:p>
+            <a:pPr lvl="1"/>
+            <a:r>
+              <a:rPr lang="en-US" dirty="0" err="1"/>
+              <a:t>UseDeveloperExceptionPage</a:t>
+            </a:r>
+            <a:endParaRPr lang="en-US" dirty="0"/>
+          </a:p>
+          <a:p>
+            <a:pPr lvl="1"/>
+            <a:r>
+              <a:rPr lang="en-US" dirty="0" err="1"/>
+              <a:t>UseExceptionHandler</a:t>
             </a:r>
             <a:endParaRPr lang="bg-BG" dirty="0"/>
-          </a:p>
-          <a:p>
-            <a:endParaRPr lang="en-US" dirty="0"/>
-          </a:p>
-          <a:p>
-            <a:r>
-              <a:rPr lang="en-US" dirty="0"/>
-              <a:t>Create </a:t>
-            </a:r>
-            <a:r>
-              <a:rPr lang="en-US" dirty="0" err="1"/>
-              <a:t>ILoggerService</a:t>
-            </a:r>
-            <a:r>
-              <a:rPr lang="en-US" dirty="0"/>
-              <a:t> interface and </a:t>
-            </a:r>
-            <a:r>
-              <a:rPr lang="en-US" dirty="0" err="1"/>
-              <a:t>LoggerService</a:t>
-            </a:r>
-            <a:r>
-              <a:rPr lang="en-US" dirty="0"/>
-              <a:t> with methods allowing log into log file</a:t>
-            </a:r>
-          </a:p>
-          <a:p>
-            <a:endParaRPr lang="en-US" dirty="0"/>
-          </a:p>
-          <a:p>
-            <a:r>
-              <a:rPr lang="en-US" dirty="0"/>
-              <a:t>Log file format should be CSV and to contain the following information</a:t>
-            </a:r>
-          </a:p>
-          <a:p>
-            <a:pPr lvl="1">
-              <a:spcBef>
-                <a:spcPts val="0"/>
-              </a:spcBef>
-            </a:pPr>
-            <a:r>
-              <a:rPr lang="en-US" dirty="0"/>
-              <a:t>Date</a:t>
-            </a:r>
-          </a:p>
-          <a:p>
-            <a:pPr lvl="1">
-              <a:spcBef>
-                <a:spcPts val="0"/>
-              </a:spcBef>
-            </a:pPr>
-            <a:r>
-              <a:rPr lang="en-US" dirty="0"/>
-              <a:t>Time</a:t>
-            </a:r>
-          </a:p>
-          <a:p>
-            <a:pPr lvl="1">
-              <a:spcBef>
-                <a:spcPts val="0"/>
-              </a:spcBef>
-            </a:pPr>
-            <a:r>
-              <a:rPr lang="en-US" dirty="0" err="1"/>
-              <a:t>LogLevel</a:t>
-            </a:r>
-            <a:r>
-              <a:rPr lang="en-US" dirty="0"/>
-              <a:t> (Info, Warning, Error, Critical)</a:t>
-            </a:r>
-          </a:p>
-          <a:p>
-            <a:pPr lvl="1">
-              <a:spcBef>
-                <a:spcPts val="0"/>
-              </a:spcBef>
-            </a:pPr>
-            <a:r>
-              <a:rPr lang="en-US" dirty="0"/>
-              <a:t>Error message</a:t>
-            </a:r>
-          </a:p>
-          <a:p>
-            <a:pPr lvl="1">
-              <a:spcBef>
-                <a:spcPts val="0"/>
-              </a:spcBef>
-            </a:pPr>
-            <a:endParaRPr lang="en-US" dirty="0"/>
-          </a:p>
-          <a:p>
-            <a:r>
-              <a:rPr lang="en-US" dirty="0"/>
-              <a:t>Inject and implement </a:t>
-            </a:r>
-            <a:r>
-              <a:rPr lang="en-US" dirty="0" err="1"/>
-              <a:t>LoggerService</a:t>
-            </a:r>
-            <a:r>
-              <a:rPr lang="en-US" dirty="0"/>
-              <a:t> to log exceptions in the controller</a:t>
-            </a:r>
           </a:p>
         </p:txBody>
       </p:sp>
     </p:spTree>
     <p:extLst>
       <p:ext uri="{BB962C8B-B14F-4D97-AF65-F5344CB8AC3E}">
-        <p14:creationId xmlns:p14="http://schemas.microsoft.com/office/powerpoint/2010/main" val="3650269123"/>
+        <p14:creationId xmlns:p14="http://schemas.microsoft.com/office/powerpoint/2010/main" val="2769485924"/>
+      </p:ext>
+    </p:extLst>
+  </p:cSld>
+  <p:clrMapOvr>
+    <a:masterClrMapping/>
+  </p:clrMapOvr>
+</p:sld>
+</file>
+
+<file path=ppt/slides/slide71.xml><?xml version="1.0" encoding="utf-8"?>
+<p:sld xmlns:a="http://schemas.openxmlformats.org/drawingml/2006/main" xmlns:r="http://schemas.openxmlformats.org/officeDocument/2006/relationships" xmlns:p="http://schemas.openxmlformats.org/presentationml/2006/main">
+  <p:cSld>
+    <p:spTree>
+      <p:nvGrpSpPr>
+        <p:cNvPr id="1" name=""/>
+        <p:cNvGrpSpPr/>
+        <p:nvPr/>
+      </p:nvGrpSpPr>
+      <p:grpSpPr>
+        <a:xfrm>
+          <a:off x="0" y="0"/>
+          <a:ext cx="0" cy="0"/>
+          <a:chOff x="0" y="0"/>
+          <a:chExt cx="0" cy="0"/>
+        </a:xfrm>
+      </p:grpSpPr>
+      <p:sp>
+        <p:nvSpPr>
+          <p:cNvPr id="2" name="Title 1">
+            <a:extLst>
+              <a:ext uri="{FF2B5EF4-FFF2-40B4-BE49-F238E27FC236}">
+                <a16:creationId xmlns:a16="http://schemas.microsoft.com/office/drawing/2014/main" id="{7821DCBD-76D1-4129-BC5E-600924119A0E}"/>
+              </a:ext>
+            </a:extLst>
+          </p:cNvPr>
+          <p:cNvSpPr>
+            <a:spLocks noGrp="1"/>
+          </p:cNvSpPr>
+          <p:nvPr>
+            <p:ph type="title"/>
+          </p:nvPr>
+        </p:nvSpPr>
+        <p:spPr/>
+        <p:txBody>
+          <a:bodyPr/>
+          <a:lstStyle/>
+          <a:p>
+            <a:r>
+              <a:rPr lang="en-US" dirty="0" err="1"/>
+              <a:t>UseDeveloperExceptionPage</a:t>
+            </a:r>
+            <a:endParaRPr lang="bg-BG" dirty="0"/>
+          </a:p>
+        </p:txBody>
+      </p:sp>
+      <p:sp>
+        <p:nvSpPr>
+          <p:cNvPr id="3" name="Text Placeholder 2">
+            <a:extLst>
+              <a:ext uri="{FF2B5EF4-FFF2-40B4-BE49-F238E27FC236}">
+                <a16:creationId xmlns:a16="http://schemas.microsoft.com/office/drawing/2014/main" id="{6E6EE87D-853A-4E26-8097-FF1BC7833F9A}"/>
+              </a:ext>
+            </a:extLst>
+          </p:cNvPr>
+          <p:cNvSpPr>
+            <a:spLocks noGrp="1"/>
+          </p:cNvSpPr>
+          <p:nvPr>
+            <p:ph type="body" idx="1"/>
+          </p:nvPr>
+        </p:nvSpPr>
+        <p:spPr>
+          <a:xfrm>
+            <a:off x="1730000" y="1743900"/>
+            <a:ext cx="9385200" cy="4227867"/>
+          </a:xfrm>
+        </p:spPr>
+        <p:txBody>
+          <a:bodyPr/>
+          <a:lstStyle/>
+          <a:p>
+            <a:r>
+              <a:rPr lang="en-US" dirty="0"/>
+              <a:t>The </a:t>
+            </a:r>
+            <a:r>
+              <a:rPr lang="en-US" dirty="0" err="1"/>
+              <a:t>UseDeveloperExceptionPage</a:t>
+            </a:r>
+            <a:r>
+              <a:rPr lang="en-US" dirty="0"/>
+              <a:t> extension method adds middleware into the request pipeline which displays developer friendly exception detail page. This helps developers in tracing errors that occur during development phase.</a:t>
+            </a:r>
+          </a:p>
+          <a:p>
+            <a:endParaRPr lang="en-US" dirty="0"/>
+          </a:p>
+          <a:p>
+            <a:r>
+              <a:rPr lang="en-US" dirty="0"/>
+              <a:t>As this middleware displays sensitive information, it is advisable to add it only in development environment.</a:t>
+            </a:r>
+            <a:endParaRPr lang="bg-BG" dirty="0"/>
+          </a:p>
+        </p:txBody>
+      </p:sp>
+      <p:pic>
+        <p:nvPicPr>
+          <p:cNvPr id="5" name="Picture 4">
+            <a:extLst>
+              <a:ext uri="{FF2B5EF4-FFF2-40B4-BE49-F238E27FC236}">
+                <a16:creationId xmlns:a16="http://schemas.microsoft.com/office/drawing/2014/main" id="{24E29CFE-16C2-4599-B285-CC8B87454D7D}"/>
+              </a:ext>
+            </a:extLst>
+          </p:cNvPr>
+          <p:cNvPicPr>
+            <a:picLocks noChangeAspect="1"/>
+          </p:cNvPicPr>
+          <p:nvPr/>
+        </p:nvPicPr>
+        <p:blipFill>
+          <a:blip r:embed="rId2"/>
+          <a:stretch>
+            <a:fillRect/>
+          </a:stretch>
+        </p:blipFill>
+        <p:spPr>
+          <a:xfrm>
+            <a:off x="2319642" y="4063343"/>
+            <a:ext cx="5987779" cy="2356892"/>
+          </a:xfrm>
+          <a:prstGeom prst="rect">
+            <a:avLst/>
+          </a:prstGeom>
+        </p:spPr>
+      </p:pic>
+    </p:spTree>
+    <p:extLst>
+      <p:ext uri="{BB962C8B-B14F-4D97-AF65-F5344CB8AC3E}">
+        <p14:creationId xmlns:p14="http://schemas.microsoft.com/office/powerpoint/2010/main" val="2907802644"/>
+      </p:ext>
+    </p:extLst>
+  </p:cSld>
+  <p:clrMapOvr>
+    <a:masterClrMapping/>
+  </p:clrMapOvr>
+</p:sld>
+</file>
+
+<file path=ppt/slides/slide72.xml><?xml version="1.0" encoding="utf-8"?>
+<p:sld xmlns:a="http://schemas.openxmlformats.org/drawingml/2006/main" xmlns:r="http://schemas.openxmlformats.org/officeDocument/2006/relationships" xmlns:p="http://schemas.openxmlformats.org/presentationml/2006/main">
+  <p:cSld>
+    <p:spTree>
+      <p:nvGrpSpPr>
+        <p:cNvPr id="1" name=""/>
+        <p:cNvGrpSpPr/>
+        <p:nvPr/>
+      </p:nvGrpSpPr>
+      <p:grpSpPr>
+        <a:xfrm>
+          <a:off x="0" y="0"/>
+          <a:ext cx="0" cy="0"/>
+          <a:chOff x="0" y="0"/>
+          <a:chExt cx="0" cy="0"/>
+        </a:xfrm>
+      </p:grpSpPr>
+      <p:sp>
+        <p:nvSpPr>
+          <p:cNvPr id="2" name="Title 1">
+            <a:extLst>
+              <a:ext uri="{FF2B5EF4-FFF2-40B4-BE49-F238E27FC236}">
+                <a16:creationId xmlns:a16="http://schemas.microsoft.com/office/drawing/2014/main" id="{2536C9C8-9EBE-4747-AF57-528E0EC5DEF0}"/>
+              </a:ext>
+            </a:extLst>
+          </p:cNvPr>
+          <p:cNvSpPr>
+            <a:spLocks noGrp="1"/>
+          </p:cNvSpPr>
+          <p:nvPr>
+            <p:ph type="title"/>
+          </p:nvPr>
+        </p:nvSpPr>
+        <p:spPr/>
+        <p:txBody>
+          <a:bodyPr/>
+          <a:lstStyle/>
+          <a:p>
+            <a:r>
+              <a:rPr lang="en-US" dirty="0" err="1"/>
+              <a:t>UseDeveloperExceptionPage</a:t>
+            </a:r>
+            <a:endParaRPr lang="bg-BG" dirty="0"/>
+          </a:p>
+        </p:txBody>
+      </p:sp>
+      <p:sp>
+        <p:nvSpPr>
+          <p:cNvPr id="3" name="Text Placeholder 2">
+            <a:extLst>
+              <a:ext uri="{FF2B5EF4-FFF2-40B4-BE49-F238E27FC236}">
+                <a16:creationId xmlns:a16="http://schemas.microsoft.com/office/drawing/2014/main" id="{1CE217FA-6879-4AF0-8596-D56EBA442CFE}"/>
+              </a:ext>
+            </a:extLst>
+          </p:cNvPr>
+          <p:cNvSpPr>
+            <a:spLocks noGrp="1"/>
+          </p:cNvSpPr>
+          <p:nvPr>
+            <p:ph type="body" idx="1"/>
+          </p:nvPr>
+        </p:nvSpPr>
+        <p:spPr>
+          <a:xfrm>
+            <a:off x="1730000" y="1536970"/>
+            <a:ext cx="5602532" cy="4434797"/>
+          </a:xfrm>
+        </p:spPr>
+        <p:txBody>
+          <a:bodyPr/>
+          <a:lstStyle/>
+          <a:p>
+            <a:r>
+              <a:rPr lang="en-US" dirty="0"/>
+              <a:t>The above code will display the following result.</a:t>
+            </a:r>
+          </a:p>
+          <a:p>
+            <a:endParaRPr lang="en-US" dirty="0"/>
+          </a:p>
+          <a:p>
+            <a:r>
+              <a:rPr lang="en-US" dirty="0"/>
+              <a:t>As you can see above, the developer exception page includes 4 tabs: Stack, Query, Cookies, and Headers. </a:t>
+            </a:r>
+          </a:p>
+          <a:p>
+            <a:pPr lvl="1"/>
+            <a:r>
+              <a:rPr lang="en-US" dirty="0"/>
+              <a:t>Stack tab displays information of stack trace, which indicates where exactly an error occurred. </a:t>
+            </a:r>
+          </a:p>
+          <a:p>
+            <a:pPr lvl="1"/>
+            <a:r>
+              <a:rPr lang="en-US" dirty="0"/>
+              <a:t>Query tab displays information about query string. </a:t>
+            </a:r>
+          </a:p>
+          <a:p>
+            <a:pPr lvl="1"/>
+            <a:r>
+              <a:rPr lang="en-US" dirty="0"/>
+              <a:t>Cookies tab displays information about cookies set by the request</a:t>
+            </a:r>
+          </a:p>
+          <a:p>
+            <a:pPr lvl="1"/>
+            <a:r>
+              <a:rPr lang="en-US" dirty="0"/>
+              <a:t>Headers tab displays information about headers.</a:t>
+            </a:r>
+          </a:p>
+          <a:p>
+            <a:endParaRPr lang="en-US" dirty="0"/>
+          </a:p>
+          <a:p>
+            <a:endParaRPr lang="en-US" dirty="0"/>
+          </a:p>
+          <a:p>
+            <a:endParaRPr lang="bg-BG" dirty="0"/>
+          </a:p>
+        </p:txBody>
+      </p:sp>
+      <p:pic>
+        <p:nvPicPr>
+          <p:cNvPr id="5122" name="Picture 2">
+            <a:extLst>
+              <a:ext uri="{FF2B5EF4-FFF2-40B4-BE49-F238E27FC236}">
+                <a16:creationId xmlns:a16="http://schemas.microsoft.com/office/drawing/2014/main" id="{A4422497-C213-4DAD-8B88-EF9328B92583}"/>
+              </a:ext>
+            </a:extLst>
+          </p:cNvPr>
+          <p:cNvPicPr>
+            <a:picLocks noChangeAspect="1" noChangeArrowheads="1"/>
+          </p:cNvPicPr>
+          <p:nvPr/>
+        </p:nvPicPr>
+        <p:blipFill>
+          <a:blip r:embed="rId2">
+            <a:extLst>
+              <a:ext uri="{28A0092B-C50C-407E-A947-70E740481C1C}">
+                <a14:useLocalDpi xmlns:a14="http://schemas.microsoft.com/office/drawing/2010/main" val="0"/>
+              </a:ext>
+            </a:extLst>
+          </a:blip>
+          <a:srcRect/>
+          <a:stretch>
+            <a:fillRect/>
+          </a:stretch>
+        </p:blipFill>
+        <p:spPr bwMode="auto">
+          <a:xfrm>
+            <a:off x="7428650" y="1655829"/>
+            <a:ext cx="4651987" cy="2916171"/>
+          </a:xfrm>
+          <a:prstGeom prst="rect">
+            <a:avLst/>
+          </a:prstGeom>
+          <a:noFill/>
+          <a:extLst>
+            <a:ext uri="{909E8E84-426E-40DD-AFC4-6F175D3DCCD1}">
+              <a14:hiddenFill xmlns:a14="http://schemas.microsoft.com/office/drawing/2010/main">
+                <a:solidFill>
+                  <a:srgbClr val="FFFFFF"/>
+                </a:solidFill>
+              </a14:hiddenFill>
+            </a:ext>
+          </a:extLst>
+        </p:spPr>
+      </p:pic>
+    </p:spTree>
+    <p:extLst>
+      <p:ext uri="{BB962C8B-B14F-4D97-AF65-F5344CB8AC3E}">
+        <p14:creationId xmlns:p14="http://schemas.microsoft.com/office/powerpoint/2010/main" val="3437295172"/>
+      </p:ext>
+    </p:extLst>
+  </p:cSld>
+  <p:clrMapOvr>
+    <a:masterClrMapping/>
+  </p:clrMapOvr>
+</p:sld>
+</file>
+
+<file path=ppt/slides/slide73.xml><?xml version="1.0" encoding="utf-8"?>
+<p:sld xmlns:a="http://schemas.openxmlformats.org/drawingml/2006/main" xmlns:r="http://schemas.openxmlformats.org/officeDocument/2006/relationships" xmlns:p="http://schemas.openxmlformats.org/presentationml/2006/main">
+  <p:cSld>
+    <p:spTree>
+      <p:nvGrpSpPr>
+        <p:cNvPr id="1" name=""/>
+        <p:cNvGrpSpPr/>
+        <p:nvPr/>
+      </p:nvGrpSpPr>
+      <p:grpSpPr>
+        <a:xfrm>
+          <a:off x="0" y="0"/>
+          <a:ext cx="0" cy="0"/>
+          <a:chOff x="0" y="0"/>
+          <a:chExt cx="0" cy="0"/>
+        </a:xfrm>
+      </p:grpSpPr>
+      <p:sp>
+        <p:nvSpPr>
+          <p:cNvPr id="2" name="Title 1">
+            <a:extLst>
+              <a:ext uri="{FF2B5EF4-FFF2-40B4-BE49-F238E27FC236}">
+                <a16:creationId xmlns:a16="http://schemas.microsoft.com/office/drawing/2014/main" id="{DA8FCE19-D703-49F1-BBA9-CA4A0D045434}"/>
+              </a:ext>
+            </a:extLst>
+          </p:cNvPr>
+          <p:cNvSpPr>
+            <a:spLocks noGrp="1"/>
+          </p:cNvSpPr>
+          <p:nvPr>
+            <p:ph type="title"/>
+          </p:nvPr>
+        </p:nvSpPr>
+        <p:spPr/>
+        <p:txBody>
+          <a:bodyPr/>
+          <a:lstStyle/>
+          <a:p>
+            <a:r>
+              <a:rPr lang="en-US" dirty="0" err="1"/>
+              <a:t>UseExceptionHandler</a:t>
+            </a:r>
+            <a:endParaRPr lang="bg-BG" dirty="0"/>
+          </a:p>
+        </p:txBody>
+      </p:sp>
+      <p:sp>
+        <p:nvSpPr>
+          <p:cNvPr id="3" name="Text Placeholder 2">
+            <a:extLst>
+              <a:ext uri="{FF2B5EF4-FFF2-40B4-BE49-F238E27FC236}">
+                <a16:creationId xmlns:a16="http://schemas.microsoft.com/office/drawing/2014/main" id="{7533A7C1-93CF-4901-984A-10F4437FE402}"/>
+              </a:ext>
+            </a:extLst>
+          </p:cNvPr>
+          <p:cNvSpPr>
+            <a:spLocks noGrp="1"/>
+          </p:cNvSpPr>
+          <p:nvPr>
+            <p:ph type="body" idx="1"/>
+          </p:nvPr>
+        </p:nvSpPr>
+        <p:spPr>
+          <a:xfrm>
+            <a:off x="1730000" y="1361872"/>
+            <a:ext cx="9385200" cy="4786009"/>
+          </a:xfrm>
+        </p:spPr>
+        <p:txBody>
+          <a:bodyPr/>
+          <a:lstStyle/>
+          <a:p>
+            <a:r>
+              <a:rPr lang="en-US" dirty="0"/>
+              <a:t>In MVC Core application, we might want some other controller to handle all exceptions and display custom user friendly error messages. The </a:t>
+            </a:r>
+            <a:r>
+              <a:rPr lang="en-US" dirty="0" err="1"/>
+              <a:t>UseExceptionHandler</a:t>
+            </a:r>
+            <a:r>
+              <a:rPr lang="en-US" dirty="0"/>
+              <a:t> extension method allows us to configure custom error handling route. This is useful when an application runs under production environment.</a:t>
+            </a:r>
+          </a:p>
+          <a:p>
+            <a:endParaRPr lang="en-US" dirty="0"/>
+          </a:p>
+          <a:p>
+            <a:endParaRPr lang="en-US" dirty="0"/>
+          </a:p>
+          <a:p>
+            <a:endParaRPr lang="en-US" dirty="0"/>
+          </a:p>
+          <a:p>
+            <a:endParaRPr lang="en-US" dirty="0"/>
+          </a:p>
+          <a:p>
+            <a:endParaRPr lang="en-US" dirty="0"/>
+          </a:p>
+          <a:p>
+            <a:endParaRPr lang="en-US" dirty="0"/>
+          </a:p>
+          <a:p>
+            <a:endParaRPr lang="en-US" dirty="0"/>
+          </a:p>
+          <a:p>
+            <a:endParaRPr lang="en-US" dirty="0"/>
+          </a:p>
+          <a:p>
+            <a:endParaRPr lang="en-US" dirty="0"/>
+          </a:p>
+          <a:p>
+            <a:r>
+              <a:rPr lang="en-US" dirty="0"/>
+              <a:t>Visual Studio automatically creates </a:t>
+            </a:r>
+            <a:r>
+              <a:rPr lang="en-US" dirty="0" err="1"/>
+              <a:t>Error.cshtml</a:t>
+            </a:r>
+            <a:r>
+              <a:rPr lang="en-US" dirty="0"/>
+              <a:t> under Home folder when you create ASP.NET Core project with MVC template.</a:t>
+            </a:r>
+            <a:endParaRPr lang="bg-BG" dirty="0"/>
+          </a:p>
+        </p:txBody>
+      </p:sp>
+      <p:pic>
+        <p:nvPicPr>
+          <p:cNvPr id="5" name="Picture 4">
+            <a:extLst>
+              <a:ext uri="{FF2B5EF4-FFF2-40B4-BE49-F238E27FC236}">
+                <a16:creationId xmlns:a16="http://schemas.microsoft.com/office/drawing/2014/main" id="{B0E84085-EB09-4752-870D-41925659DD1A}"/>
+              </a:ext>
+            </a:extLst>
+          </p:cNvPr>
+          <p:cNvPicPr>
+            <a:picLocks noChangeAspect="1"/>
+          </p:cNvPicPr>
+          <p:nvPr/>
+        </p:nvPicPr>
+        <p:blipFill>
+          <a:blip r:embed="rId2"/>
+          <a:stretch>
+            <a:fillRect/>
+          </a:stretch>
+        </p:blipFill>
+        <p:spPr>
+          <a:xfrm>
+            <a:off x="3525973" y="2728608"/>
+            <a:ext cx="4625806" cy="2478317"/>
+          </a:xfrm>
+          <a:prstGeom prst="rect">
+            <a:avLst/>
+          </a:prstGeom>
+        </p:spPr>
+      </p:pic>
+    </p:spTree>
+    <p:extLst>
+      <p:ext uri="{BB962C8B-B14F-4D97-AF65-F5344CB8AC3E}">
+        <p14:creationId xmlns:p14="http://schemas.microsoft.com/office/powerpoint/2010/main" val="393006320"/>
+      </p:ext>
+    </p:extLst>
+  </p:cSld>
+  <p:clrMapOvr>
+    <a:masterClrMapping/>
+  </p:clrMapOvr>
+</p:sld>
+</file>
+
+<file path=ppt/slides/slide74.xml><?xml version="1.0" encoding="utf-8"?>
+<p:sld xmlns:a="http://schemas.openxmlformats.org/drawingml/2006/main" xmlns:r="http://schemas.openxmlformats.org/officeDocument/2006/relationships" xmlns:p="http://schemas.openxmlformats.org/presentationml/2006/main">
+  <p:cSld>
+    <p:spTree>
+      <p:nvGrpSpPr>
+        <p:cNvPr id="1" name=""/>
+        <p:cNvGrpSpPr/>
+        <p:nvPr/>
+      </p:nvGrpSpPr>
+      <p:grpSpPr>
+        <a:xfrm>
+          <a:off x="0" y="0"/>
+          <a:ext cx="0" cy="0"/>
+          <a:chOff x="0" y="0"/>
+          <a:chExt cx="0" cy="0"/>
+        </a:xfrm>
+      </p:grpSpPr>
+      <p:sp>
+        <p:nvSpPr>
+          <p:cNvPr id="474114" name="Rectangle 2"/>
+          <p:cNvSpPr>
+            <a:spLocks noGrp="1" noChangeArrowheads="1"/>
+          </p:cNvSpPr>
+          <p:nvPr>
+            <p:ph type="ctrTitle"/>
+          </p:nvPr>
+        </p:nvSpPr>
+        <p:spPr>
+          <a:xfrm>
+            <a:off x="4319080" y="2299009"/>
+            <a:ext cx="7607031" cy="1339136"/>
+          </a:xfrm>
+        </p:spPr>
+        <p:txBody>
+          <a:bodyPr/>
+          <a:lstStyle/>
+          <a:p>
+            <a:pPr>
+              <a:spcBef>
+                <a:spcPts val="300"/>
+              </a:spcBef>
+              <a:spcAft>
+                <a:spcPts val="300"/>
+              </a:spcAft>
+            </a:pPr>
+            <a:r>
+              <a:rPr lang="en-US" sz="4800" dirty="0"/>
+              <a:t>ASP.NET Core – </a:t>
+            </a:r>
+            <a:br>
+              <a:rPr lang="en-US" sz="4800" dirty="0"/>
+            </a:br>
+            <a:r>
+              <a:rPr lang="en-US" sz="4800" dirty="0"/>
+              <a:t>Static files</a:t>
+            </a:r>
+          </a:p>
+        </p:txBody>
+      </p:sp>
+    </p:spTree>
+    <p:extLst>
+      <p:ext uri="{BB962C8B-B14F-4D97-AF65-F5344CB8AC3E}">
+        <p14:creationId xmlns:p14="http://schemas.microsoft.com/office/powerpoint/2010/main" val="1809884173"/>
+      </p:ext>
+    </p:extLst>
+  </p:cSld>
+  <p:clrMapOvr>
+    <a:masterClrMapping/>
+  </p:clrMapOvr>
+  <p:transition/>
+</p:sld>
+</file>
+
+<file path=ppt/slides/slide75.xml><?xml version="1.0" encoding="utf-8"?>
+<p:sld xmlns:a="http://schemas.openxmlformats.org/drawingml/2006/main" xmlns:r="http://schemas.openxmlformats.org/officeDocument/2006/relationships" xmlns:p="http://schemas.openxmlformats.org/presentationml/2006/main">
+  <p:cSld>
+    <p:spTree>
+      <p:nvGrpSpPr>
+        <p:cNvPr id="1" name=""/>
+        <p:cNvGrpSpPr/>
+        <p:nvPr/>
+      </p:nvGrpSpPr>
+      <p:grpSpPr>
+        <a:xfrm>
+          <a:off x="0" y="0"/>
+          <a:ext cx="0" cy="0"/>
+          <a:chOff x="0" y="0"/>
+          <a:chExt cx="0" cy="0"/>
+        </a:xfrm>
+      </p:grpSpPr>
+      <p:sp>
+        <p:nvSpPr>
+          <p:cNvPr id="2" name="Title 1">
+            <a:extLst>
+              <a:ext uri="{FF2B5EF4-FFF2-40B4-BE49-F238E27FC236}">
+                <a16:creationId xmlns:a16="http://schemas.microsoft.com/office/drawing/2014/main" id="{9659C768-5FCF-495C-AA0C-E551F227C61A}"/>
+              </a:ext>
+            </a:extLst>
+          </p:cNvPr>
+          <p:cNvSpPr>
+            <a:spLocks noGrp="1"/>
+          </p:cNvSpPr>
+          <p:nvPr>
+            <p:ph type="title"/>
+          </p:nvPr>
+        </p:nvSpPr>
+        <p:spPr/>
+        <p:txBody>
+          <a:bodyPr/>
+          <a:lstStyle/>
+          <a:p>
+            <a:r>
+              <a:rPr lang="en-US" dirty="0"/>
+              <a:t>ASP.NET Core - Serving Static Files</a:t>
+            </a:r>
+            <a:endParaRPr lang="bg-BG" dirty="0"/>
+          </a:p>
+        </p:txBody>
+      </p:sp>
+      <p:sp>
+        <p:nvSpPr>
+          <p:cNvPr id="3" name="Text Placeholder 2">
+            <a:extLst>
+              <a:ext uri="{FF2B5EF4-FFF2-40B4-BE49-F238E27FC236}">
+                <a16:creationId xmlns:a16="http://schemas.microsoft.com/office/drawing/2014/main" id="{4DD3A575-5E79-478A-8483-E486A79C2841}"/>
+              </a:ext>
+            </a:extLst>
+          </p:cNvPr>
+          <p:cNvSpPr>
+            <a:spLocks noGrp="1"/>
+          </p:cNvSpPr>
+          <p:nvPr>
+            <p:ph type="body" idx="1"/>
+          </p:nvPr>
+        </p:nvSpPr>
+        <p:spPr>
+          <a:xfrm>
+            <a:off x="1730000" y="2090066"/>
+            <a:ext cx="9385200" cy="4414495"/>
+          </a:xfrm>
+        </p:spPr>
+        <p:txBody>
+          <a:bodyPr/>
+          <a:lstStyle/>
+          <a:p>
+            <a:r>
+              <a:rPr lang="en-US" dirty="0"/>
+              <a:t>The </a:t>
+            </a:r>
+            <a:r>
+              <a:rPr lang="en-US" dirty="0" err="1"/>
+              <a:t>Microsoft.AspNetCore.StaticFiles</a:t>
+            </a:r>
+            <a:r>
+              <a:rPr lang="en-US" dirty="0"/>
+              <a:t> middleware package is already included in the meta package </a:t>
+            </a:r>
+            <a:r>
+              <a:rPr lang="en-US" dirty="0" err="1"/>
+              <a:t>Microsoft.AspNetCore.All</a:t>
+            </a:r>
+            <a:r>
+              <a:rPr lang="en-US" dirty="0"/>
+              <a:t>, so we don't need to install it separately in ASP.NET Core 2.x application.</a:t>
+            </a:r>
+          </a:p>
+          <a:p>
+            <a:endParaRPr lang="en-US" dirty="0"/>
+          </a:p>
+          <a:p>
+            <a:endParaRPr lang="en-US" dirty="0"/>
+          </a:p>
+          <a:p>
+            <a:endParaRPr lang="en-US" dirty="0"/>
+          </a:p>
+          <a:p>
+            <a:endParaRPr lang="en-US" dirty="0"/>
+          </a:p>
+          <a:p>
+            <a:endParaRPr lang="en-US" dirty="0"/>
+          </a:p>
+          <a:p>
+            <a:endParaRPr lang="en-US" dirty="0"/>
+          </a:p>
+          <a:p>
+            <a:endParaRPr lang="en-US" dirty="0"/>
+          </a:p>
+          <a:p>
+            <a:endParaRPr lang="en-US" dirty="0"/>
+          </a:p>
+          <a:p>
+            <a:endParaRPr lang="en-US" dirty="0"/>
+          </a:p>
+          <a:p>
+            <a:r>
+              <a:rPr lang="en-US" dirty="0"/>
+              <a:t>This way we can serve any other file stored in </a:t>
+            </a:r>
+            <a:r>
+              <a:rPr lang="en-US" dirty="0" err="1"/>
+              <a:t>wwwroot</a:t>
+            </a:r>
+            <a:r>
+              <a:rPr lang="en-US" dirty="0"/>
+              <a:t> folder or sub-folder.</a:t>
+            </a:r>
+            <a:endParaRPr lang="bg-BG" dirty="0"/>
+          </a:p>
+        </p:txBody>
+      </p:sp>
+      <p:pic>
+        <p:nvPicPr>
+          <p:cNvPr id="5" name="Picture 4">
+            <a:extLst>
+              <a:ext uri="{FF2B5EF4-FFF2-40B4-BE49-F238E27FC236}">
+                <a16:creationId xmlns:a16="http://schemas.microsoft.com/office/drawing/2014/main" id="{4FF50D3C-9D90-4CDE-BCE7-AA50ED1C20F4}"/>
+              </a:ext>
+            </a:extLst>
+          </p:cNvPr>
+          <p:cNvPicPr>
+            <a:picLocks noChangeAspect="1"/>
+          </p:cNvPicPr>
+          <p:nvPr/>
+        </p:nvPicPr>
+        <p:blipFill>
+          <a:blip r:embed="rId2"/>
+          <a:stretch>
+            <a:fillRect/>
+          </a:stretch>
+        </p:blipFill>
+        <p:spPr>
+          <a:xfrm>
+            <a:off x="2282758" y="3196144"/>
+            <a:ext cx="4584970" cy="2486937"/>
+          </a:xfrm>
+          <a:prstGeom prst="rect">
+            <a:avLst/>
+          </a:prstGeom>
+        </p:spPr>
+      </p:pic>
+    </p:spTree>
+    <p:extLst>
+      <p:ext uri="{BB962C8B-B14F-4D97-AF65-F5344CB8AC3E}">
+        <p14:creationId xmlns:p14="http://schemas.microsoft.com/office/powerpoint/2010/main" val="3414867192"/>
+      </p:ext>
+    </p:extLst>
+  </p:cSld>
+  <p:clrMapOvr>
+    <a:masterClrMapping/>
+  </p:clrMapOvr>
+</p:sld>
+</file>
+
+<file path=ppt/slides/slide76.xml><?xml version="1.0" encoding="utf-8"?>
+<p:sld xmlns:a="http://schemas.openxmlformats.org/drawingml/2006/main" xmlns:r="http://schemas.openxmlformats.org/officeDocument/2006/relationships" xmlns:p="http://schemas.openxmlformats.org/presentationml/2006/main">
+  <p:cSld>
+    <p:spTree>
+      <p:nvGrpSpPr>
+        <p:cNvPr id="1" name=""/>
+        <p:cNvGrpSpPr/>
+        <p:nvPr/>
+      </p:nvGrpSpPr>
+      <p:grpSpPr>
+        <a:xfrm>
+          <a:off x="0" y="0"/>
+          <a:ext cx="0" cy="0"/>
+          <a:chOff x="0" y="0"/>
+          <a:chExt cx="0" cy="0"/>
+        </a:xfrm>
+      </p:grpSpPr>
+      <p:sp>
+        <p:nvSpPr>
+          <p:cNvPr id="2" name="Title 1">
+            <a:extLst>
+              <a:ext uri="{FF2B5EF4-FFF2-40B4-BE49-F238E27FC236}">
+                <a16:creationId xmlns:a16="http://schemas.microsoft.com/office/drawing/2014/main" id="{742F4381-8849-41FA-ADEC-AE1DF583B12D}"/>
+              </a:ext>
+            </a:extLst>
+          </p:cNvPr>
+          <p:cNvSpPr>
+            <a:spLocks noGrp="1"/>
+          </p:cNvSpPr>
+          <p:nvPr>
+            <p:ph type="title"/>
+          </p:nvPr>
+        </p:nvSpPr>
+        <p:spPr/>
+        <p:txBody>
+          <a:bodyPr/>
+          <a:lstStyle/>
+          <a:p>
+            <a:r>
+              <a:rPr lang="en-US" dirty="0"/>
+              <a:t>ASP.NET Core - Serving Static Files</a:t>
+            </a:r>
+            <a:endParaRPr lang="bg-BG" dirty="0"/>
+          </a:p>
+        </p:txBody>
+      </p:sp>
+      <p:sp>
+        <p:nvSpPr>
+          <p:cNvPr id="3" name="Text Placeholder 2">
+            <a:extLst>
+              <a:ext uri="{FF2B5EF4-FFF2-40B4-BE49-F238E27FC236}">
+                <a16:creationId xmlns:a16="http://schemas.microsoft.com/office/drawing/2014/main" id="{94D3B142-1B42-4F66-9D25-99ADE9BF4976}"/>
+              </a:ext>
+            </a:extLst>
+          </p:cNvPr>
+          <p:cNvSpPr>
+            <a:spLocks noGrp="1"/>
+          </p:cNvSpPr>
+          <p:nvPr>
+            <p:ph type="body" idx="1"/>
+          </p:nvPr>
+        </p:nvSpPr>
+        <p:spPr>
+          <a:xfrm>
+            <a:off x="1730000" y="1452664"/>
+            <a:ext cx="9385200" cy="4980562"/>
+          </a:xfrm>
+        </p:spPr>
+        <p:txBody>
+          <a:bodyPr/>
+          <a:lstStyle/>
+          <a:p>
+            <a:r>
+              <a:rPr lang="en-US" dirty="0"/>
+              <a:t>Suppose, you want to serve files from the outside of web root folder (</a:t>
+            </a:r>
+            <a:r>
+              <a:rPr lang="en-US" dirty="0" err="1"/>
+              <a:t>wwwroot</a:t>
+            </a:r>
+            <a:r>
+              <a:rPr lang="en-US" dirty="0"/>
+              <a:t>). For example, you include images in the following Images folder as shown below.</a:t>
+            </a:r>
+          </a:p>
+          <a:p>
+            <a:endParaRPr lang="en-US" dirty="0"/>
+          </a:p>
+          <a:p>
+            <a:endParaRPr lang="en-US" dirty="0"/>
+          </a:p>
+          <a:p>
+            <a:endParaRPr lang="en-US" dirty="0"/>
+          </a:p>
+          <a:p>
+            <a:endParaRPr lang="en-US" dirty="0"/>
+          </a:p>
+          <a:p>
+            <a:endParaRPr lang="en-US" dirty="0"/>
+          </a:p>
+          <a:p>
+            <a:endParaRPr lang="en-US" dirty="0"/>
+          </a:p>
+          <a:p>
+            <a:endParaRPr lang="en-US" dirty="0"/>
+          </a:p>
+          <a:p>
+            <a:endParaRPr lang="en-US" dirty="0"/>
+          </a:p>
+          <a:p>
+            <a:endParaRPr lang="en-US" dirty="0"/>
+          </a:p>
+          <a:p>
+            <a:r>
+              <a:rPr lang="en-US" dirty="0"/>
+              <a:t>Now, a request to </a:t>
+            </a:r>
+            <a:r>
+              <a:rPr lang="en-US" dirty="0">
+                <a:hlinkClick r:id="rId2"/>
+              </a:rPr>
+              <a:t>http://localhost/app-images/MyImage.png</a:t>
+            </a:r>
+            <a:r>
+              <a:rPr lang="en-US" dirty="0"/>
+              <a:t>  will </a:t>
+            </a:r>
+          </a:p>
+          <a:p>
+            <a:pPr marL="120650" indent="0">
+              <a:buNone/>
+            </a:pPr>
+            <a:r>
+              <a:rPr lang="en-US" dirty="0"/>
+              <a:t>serve the MyImage.png file.</a:t>
+            </a:r>
+            <a:endParaRPr lang="bg-BG" dirty="0"/>
+          </a:p>
+        </p:txBody>
+      </p:sp>
+      <p:pic>
+        <p:nvPicPr>
+          <p:cNvPr id="6146" name="Picture 2">
+            <a:extLst>
+              <a:ext uri="{FF2B5EF4-FFF2-40B4-BE49-F238E27FC236}">
+                <a16:creationId xmlns:a16="http://schemas.microsoft.com/office/drawing/2014/main" id="{3758E817-369D-4093-B4CC-C6304A2AB33B}"/>
+              </a:ext>
+            </a:extLst>
+          </p:cNvPr>
+          <p:cNvPicPr>
+            <a:picLocks noChangeAspect="1" noChangeArrowheads="1"/>
+          </p:cNvPicPr>
+          <p:nvPr/>
+        </p:nvPicPr>
+        <p:blipFill>
+          <a:blip r:embed="rId3">
+            <a:extLst>
+              <a:ext uri="{28A0092B-C50C-407E-A947-70E740481C1C}">
+                <a14:useLocalDpi xmlns:a14="http://schemas.microsoft.com/office/drawing/2010/main" val="0"/>
+              </a:ext>
+            </a:extLst>
+          </a:blip>
+          <a:srcRect/>
+          <a:stretch>
+            <a:fillRect/>
+          </a:stretch>
+        </p:blipFill>
+        <p:spPr bwMode="auto">
+          <a:xfrm>
+            <a:off x="9499013" y="1897791"/>
+            <a:ext cx="2509633" cy="3817933"/>
+          </a:xfrm>
+          <a:prstGeom prst="rect">
+            <a:avLst/>
+          </a:prstGeom>
+          <a:noFill/>
+          <a:extLst>
+            <a:ext uri="{909E8E84-426E-40DD-AFC4-6F175D3DCCD1}">
+              <a14:hiddenFill xmlns:a14="http://schemas.microsoft.com/office/drawing/2010/main">
+                <a:solidFill>
+                  <a:srgbClr val="FFFFFF"/>
+                </a:solidFill>
+              </a14:hiddenFill>
+            </a:ext>
+          </a:extLst>
+        </p:spPr>
+      </p:pic>
+      <p:pic>
+        <p:nvPicPr>
+          <p:cNvPr id="5" name="Picture 4">
+            <a:extLst>
+              <a:ext uri="{FF2B5EF4-FFF2-40B4-BE49-F238E27FC236}">
+                <a16:creationId xmlns:a16="http://schemas.microsoft.com/office/drawing/2014/main" id="{4F3E26D8-CE6D-43DB-9B46-1DC5B118A3B3}"/>
+              </a:ext>
+            </a:extLst>
+          </p:cNvPr>
+          <p:cNvPicPr>
+            <a:picLocks noChangeAspect="1"/>
+          </p:cNvPicPr>
+          <p:nvPr/>
+        </p:nvPicPr>
+        <p:blipFill>
+          <a:blip r:embed="rId4"/>
+          <a:stretch>
+            <a:fillRect/>
+          </a:stretch>
+        </p:blipFill>
+        <p:spPr>
+          <a:xfrm>
+            <a:off x="1892130" y="2276576"/>
+            <a:ext cx="6127257" cy="2110294"/>
+          </a:xfrm>
+          <a:prstGeom prst="rect">
+            <a:avLst/>
+          </a:prstGeom>
+        </p:spPr>
+      </p:pic>
+    </p:spTree>
+    <p:extLst>
+      <p:ext uri="{BB962C8B-B14F-4D97-AF65-F5344CB8AC3E}">
+        <p14:creationId xmlns:p14="http://schemas.microsoft.com/office/powerpoint/2010/main" val="715303004"/>
+      </p:ext>
+    </p:extLst>
+  </p:cSld>
+  <p:clrMapOvr>
+    <a:masterClrMapping/>
+  </p:clrMapOvr>
+</p:sld>
+</file>
+
+<file path=ppt/slides/slide77.xml><?xml version="1.0" encoding="utf-8"?>
+<p:sld xmlns:a="http://schemas.openxmlformats.org/drawingml/2006/main" xmlns:r="http://schemas.openxmlformats.org/officeDocument/2006/relationships" xmlns:p="http://schemas.openxmlformats.org/presentationml/2006/main">
+  <p:cSld>
+    <p:spTree>
+      <p:nvGrpSpPr>
+        <p:cNvPr id="1" name=""/>
+        <p:cNvGrpSpPr/>
+        <p:nvPr/>
+      </p:nvGrpSpPr>
+      <p:grpSpPr>
+        <a:xfrm>
+          <a:off x="0" y="0"/>
+          <a:ext cx="0" cy="0"/>
+          <a:chOff x="0" y="0"/>
+          <a:chExt cx="0" cy="0"/>
+        </a:xfrm>
+      </p:grpSpPr>
+      <p:sp>
+        <p:nvSpPr>
+          <p:cNvPr id="474114" name="Rectangle 2"/>
+          <p:cNvSpPr>
+            <a:spLocks noGrp="1" noChangeArrowheads="1"/>
+          </p:cNvSpPr>
+          <p:nvPr>
+            <p:ph type="ctrTitle"/>
+          </p:nvPr>
+        </p:nvSpPr>
+        <p:spPr>
+          <a:xfrm>
+            <a:off x="3947404" y="2299009"/>
+            <a:ext cx="7978708" cy="1339136"/>
+          </a:xfrm>
+        </p:spPr>
+        <p:txBody>
+          <a:bodyPr/>
+          <a:lstStyle/>
+          <a:p>
+            <a:pPr>
+              <a:spcBef>
+                <a:spcPts val="300"/>
+              </a:spcBef>
+              <a:spcAft>
+                <a:spcPts val="300"/>
+              </a:spcAft>
+            </a:pPr>
+            <a:r>
+              <a:rPr lang="en-US" sz="4800" dirty="0"/>
+              <a:t>Logging in ASP.NET Core</a:t>
+            </a:r>
+          </a:p>
+        </p:txBody>
+      </p:sp>
+    </p:spTree>
+    <p:extLst>
+      <p:ext uri="{BB962C8B-B14F-4D97-AF65-F5344CB8AC3E}">
+        <p14:creationId xmlns:p14="http://schemas.microsoft.com/office/powerpoint/2010/main" val="2420581427"/>
+      </p:ext>
+    </p:extLst>
+  </p:cSld>
+  <p:clrMapOvr>
+    <a:masterClrMapping/>
+  </p:clrMapOvr>
+  <p:transition/>
+</p:sld>
+</file>
+
+<file path=ppt/slides/slide78.xml><?xml version="1.0" encoding="utf-8"?>
+<p:sld xmlns:a="http://schemas.openxmlformats.org/drawingml/2006/main" xmlns:r="http://schemas.openxmlformats.org/officeDocument/2006/relationships" xmlns:p="http://schemas.openxmlformats.org/presentationml/2006/main">
+  <p:cSld>
+    <p:spTree>
+      <p:nvGrpSpPr>
+        <p:cNvPr id="1" name=""/>
+        <p:cNvGrpSpPr/>
+        <p:nvPr/>
+      </p:nvGrpSpPr>
+      <p:grpSpPr>
+        <a:xfrm>
+          <a:off x="0" y="0"/>
+          <a:ext cx="0" cy="0"/>
+          <a:chOff x="0" y="0"/>
+          <a:chExt cx="0" cy="0"/>
+        </a:xfrm>
+      </p:grpSpPr>
+      <p:sp>
+        <p:nvSpPr>
+          <p:cNvPr id="2" name="Title 1">
+            <a:extLst>
+              <a:ext uri="{FF2B5EF4-FFF2-40B4-BE49-F238E27FC236}">
+                <a16:creationId xmlns:a16="http://schemas.microsoft.com/office/drawing/2014/main" id="{E78E8862-C04B-4216-A1A7-450391CDCE6E}"/>
+              </a:ext>
+            </a:extLst>
+          </p:cNvPr>
+          <p:cNvSpPr>
+            <a:spLocks noGrp="1"/>
+          </p:cNvSpPr>
+          <p:nvPr>
+            <p:ph type="title"/>
+          </p:nvPr>
+        </p:nvSpPr>
+        <p:spPr/>
+        <p:txBody>
+          <a:bodyPr/>
+          <a:lstStyle/>
+          <a:p>
+            <a:r>
+              <a:rPr lang="en-US" dirty="0"/>
+              <a:t>Fundamentals of Logging in .NET Core</a:t>
+            </a:r>
+            <a:endParaRPr lang="bg-BG" dirty="0"/>
+          </a:p>
+        </p:txBody>
+      </p:sp>
+      <p:sp>
+        <p:nvSpPr>
+          <p:cNvPr id="3" name="Text Placeholder 2">
+            <a:extLst>
+              <a:ext uri="{FF2B5EF4-FFF2-40B4-BE49-F238E27FC236}">
+                <a16:creationId xmlns:a16="http://schemas.microsoft.com/office/drawing/2014/main" id="{AC5BB2FB-2481-4F50-A2B0-5C54F8CA0825}"/>
+              </a:ext>
+            </a:extLst>
+          </p:cNvPr>
+          <p:cNvSpPr>
+            <a:spLocks noGrp="1"/>
+          </p:cNvSpPr>
+          <p:nvPr>
+            <p:ph type="body" idx="1"/>
+          </p:nvPr>
+        </p:nvSpPr>
+        <p:spPr/>
+        <p:txBody>
+          <a:bodyPr/>
+          <a:lstStyle/>
+          <a:p>
+            <a:r>
+              <a:rPr lang="en-US" dirty="0"/>
+              <a:t>The Logging API is included in the </a:t>
+            </a:r>
+            <a:r>
+              <a:rPr lang="en-US" dirty="0" err="1"/>
+              <a:t>Microsoft.Extensions.Logging</a:t>
+            </a:r>
+            <a:r>
+              <a:rPr lang="en-US" dirty="0"/>
+              <a:t> package. </a:t>
+            </a:r>
+            <a:endParaRPr lang="bg-BG" dirty="0"/>
+          </a:p>
+          <a:p>
+            <a:endParaRPr lang="bg-BG" dirty="0"/>
+          </a:p>
+          <a:p>
+            <a:r>
+              <a:rPr lang="en-US" dirty="0"/>
+              <a:t>The Logging API does not work as standalone. It works with one or more logging providers that store or display logs to a particular medium such as Console, Debug, </a:t>
+            </a:r>
+            <a:r>
+              <a:rPr lang="en-US" dirty="0" err="1"/>
+              <a:t>TraceListeners</a:t>
+            </a:r>
+            <a:r>
+              <a:rPr lang="en-US" dirty="0"/>
+              <a:t> etc.</a:t>
+            </a:r>
+          </a:p>
+          <a:p>
+            <a:endParaRPr lang="en-US" dirty="0"/>
+          </a:p>
+          <a:p>
+            <a:r>
+              <a:rPr lang="en-US" dirty="0"/>
+              <a:t>So, there are two important building blocks for implementing logging in a .NET Core based application:</a:t>
+            </a:r>
+          </a:p>
+          <a:p>
+            <a:pPr lvl="1"/>
+            <a:r>
+              <a:rPr lang="en-US" dirty="0"/>
+              <a:t>Logging API</a:t>
+            </a:r>
+          </a:p>
+          <a:p>
+            <a:pPr lvl="1"/>
+            <a:r>
+              <a:rPr lang="en-US" dirty="0"/>
+              <a:t>Logging Providers</a:t>
+            </a:r>
+            <a:endParaRPr lang="bg-BG" dirty="0"/>
+          </a:p>
+        </p:txBody>
+      </p:sp>
+    </p:spTree>
+    <p:extLst>
+      <p:ext uri="{BB962C8B-B14F-4D97-AF65-F5344CB8AC3E}">
+        <p14:creationId xmlns:p14="http://schemas.microsoft.com/office/powerpoint/2010/main" val="3142235865"/>
+      </p:ext>
+    </p:extLst>
+  </p:cSld>
+  <p:clrMapOvr>
+    <a:masterClrMapping/>
+  </p:clrMapOvr>
+</p:sld>
+</file>
+
+<file path=ppt/slides/slide79.xml><?xml version="1.0" encoding="utf-8"?>
+<p:sld xmlns:a="http://schemas.openxmlformats.org/drawingml/2006/main" xmlns:r="http://schemas.openxmlformats.org/officeDocument/2006/relationships" xmlns:p="http://schemas.openxmlformats.org/presentationml/2006/main">
+  <p:cSld>
+    <p:spTree>
+      <p:nvGrpSpPr>
+        <p:cNvPr id="1" name=""/>
+        <p:cNvGrpSpPr/>
+        <p:nvPr/>
+      </p:nvGrpSpPr>
+      <p:grpSpPr>
+        <a:xfrm>
+          <a:off x="0" y="0"/>
+          <a:ext cx="0" cy="0"/>
+          <a:chOff x="0" y="0"/>
+          <a:chExt cx="0" cy="0"/>
+        </a:xfrm>
+      </p:grpSpPr>
+      <p:sp>
+        <p:nvSpPr>
+          <p:cNvPr id="2" name="Title 1">
+            <a:extLst>
+              <a:ext uri="{FF2B5EF4-FFF2-40B4-BE49-F238E27FC236}">
+                <a16:creationId xmlns:a16="http://schemas.microsoft.com/office/drawing/2014/main" id="{17605C06-5A44-47B6-BA95-D1D756C709F7}"/>
+              </a:ext>
+            </a:extLst>
+          </p:cNvPr>
+          <p:cNvSpPr>
+            <a:spLocks noGrp="1"/>
+          </p:cNvSpPr>
+          <p:nvPr>
+            <p:ph type="title"/>
+          </p:nvPr>
+        </p:nvSpPr>
+        <p:spPr/>
+        <p:txBody>
+          <a:bodyPr/>
+          <a:lstStyle/>
+          <a:p>
+            <a:r>
+              <a:rPr lang="en-US" dirty="0"/>
+              <a:t>Fundamentals of Logging in .NET Core</a:t>
+            </a:r>
+            <a:endParaRPr lang="bg-BG" dirty="0"/>
+          </a:p>
+        </p:txBody>
+      </p:sp>
+      <p:sp>
+        <p:nvSpPr>
+          <p:cNvPr id="3" name="Text Placeholder 2">
+            <a:extLst>
+              <a:ext uri="{FF2B5EF4-FFF2-40B4-BE49-F238E27FC236}">
+                <a16:creationId xmlns:a16="http://schemas.microsoft.com/office/drawing/2014/main" id="{663A2C31-6EB1-449D-902C-35FA54917C66}"/>
+              </a:ext>
+            </a:extLst>
+          </p:cNvPr>
+          <p:cNvSpPr>
+            <a:spLocks noGrp="1"/>
+          </p:cNvSpPr>
+          <p:nvPr>
+            <p:ph type="body" idx="1"/>
+          </p:nvPr>
+        </p:nvSpPr>
+        <p:spPr>
+          <a:xfrm>
+            <a:off x="1730000" y="2090067"/>
+            <a:ext cx="9385200" cy="724469"/>
+          </a:xfrm>
+        </p:spPr>
+        <p:txBody>
+          <a:bodyPr/>
+          <a:lstStyle/>
+          <a:p>
+            <a:r>
+              <a:rPr lang="en-US" dirty="0"/>
+              <a:t>The following figure illustrates logging in .NET Core:</a:t>
+            </a:r>
+            <a:endParaRPr lang="bg-BG" dirty="0"/>
+          </a:p>
+        </p:txBody>
+      </p:sp>
+      <p:pic>
+        <p:nvPicPr>
+          <p:cNvPr id="7170" name="Picture 2">
+            <a:extLst>
+              <a:ext uri="{FF2B5EF4-FFF2-40B4-BE49-F238E27FC236}">
+                <a16:creationId xmlns:a16="http://schemas.microsoft.com/office/drawing/2014/main" id="{320388D3-A5AC-4636-A46C-90BC6976F82A}"/>
+              </a:ext>
+            </a:extLst>
+          </p:cNvPr>
+          <p:cNvPicPr>
+            <a:picLocks noChangeAspect="1" noChangeArrowheads="1"/>
+          </p:cNvPicPr>
+          <p:nvPr/>
+        </p:nvPicPr>
+        <p:blipFill>
+          <a:blip r:embed="rId2">
+            <a:extLst>
+              <a:ext uri="{28A0092B-C50C-407E-A947-70E740481C1C}">
+                <a14:useLocalDpi xmlns:a14="http://schemas.microsoft.com/office/drawing/2010/main" val="0"/>
+              </a:ext>
+            </a:extLst>
+          </a:blip>
+          <a:srcRect/>
+          <a:stretch>
+            <a:fillRect/>
+          </a:stretch>
+        </p:blipFill>
+        <p:spPr bwMode="auto">
+          <a:xfrm>
+            <a:off x="2341528" y="2588976"/>
+            <a:ext cx="7962900" cy="2419350"/>
+          </a:xfrm>
+          <a:prstGeom prst="rect">
+            <a:avLst/>
+          </a:prstGeom>
+          <a:noFill/>
+          <a:extLst>
+            <a:ext uri="{909E8E84-426E-40DD-AFC4-6F175D3DCCD1}">
+              <a14:hiddenFill xmlns:a14="http://schemas.microsoft.com/office/drawing/2010/main">
+                <a:solidFill>
+                  <a:srgbClr val="FFFFFF"/>
+                </a:solidFill>
+              </a14:hiddenFill>
+            </a:ext>
+          </a:extLst>
+        </p:spPr>
+      </p:pic>
+    </p:spTree>
+    <p:extLst>
+      <p:ext uri="{BB962C8B-B14F-4D97-AF65-F5344CB8AC3E}">
+        <p14:creationId xmlns:p14="http://schemas.microsoft.com/office/powerpoint/2010/main" val="3590295793"/>
       </p:ext>
     </p:extLst>
   </p:cSld>
@@ -21170,6 +23086,1705 @@
     <p:extLst>
       <p:ext uri="{BB962C8B-B14F-4D97-AF65-F5344CB8AC3E}">
         <p14:creationId xmlns:p14="http://schemas.microsoft.com/office/powerpoint/2010/main" val="1688940609"/>
+      </p:ext>
+    </p:extLst>
+  </p:cSld>
+  <p:clrMapOvr>
+    <a:masterClrMapping/>
+  </p:clrMapOvr>
+</p:sld>
+</file>
+
+<file path=ppt/slides/slide80.xml><?xml version="1.0" encoding="utf-8"?>
+<p:sld xmlns:a="http://schemas.openxmlformats.org/drawingml/2006/main" xmlns:r="http://schemas.openxmlformats.org/officeDocument/2006/relationships" xmlns:p="http://schemas.openxmlformats.org/presentationml/2006/main">
+  <p:cSld>
+    <p:spTree>
+      <p:nvGrpSpPr>
+        <p:cNvPr id="1" name=""/>
+        <p:cNvGrpSpPr/>
+        <p:nvPr/>
+      </p:nvGrpSpPr>
+      <p:grpSpPr>
+        <a:xfrm>
+          <a:off x="0" y="0"/>
+          <a:ext cx="0" cy="0"/>
+          <a:chOff x="0" y="0"/>
+          <a:chExt cx="0" cy="0"/>
+        </a:xfrm>
+      </p:grpSpPr>
+      <p:sp>
+        <p:nvSpPr>
+          <p:cNvPr id="2" name="Title 1">
+            <a:extLst>
+              <a:ext uri="{FF2B5EF4-FFF2-40B4-BE49-F238E27FC236}">
+                <a16:creationId xmlns:a16="http://schemas.microsoft.com/office/drawing/2014/main" id="{681E4D9B-42A3-4A5A-813D-94682E0D88CC}"/>
+              </a:ext>
+            </a:extLst>
+          </p:cNvPr>
+          <p:cNvSpPr>
+            <a:spLocks noGrp="1"/>
+          </p:cNvSpPr>
+          <p:nvPr>
+            <p:ph type="title"/>
+          </p:nvPr>
+        </p:nvSpPr>
+        <p:spPr/>
+        <p:txBody>
+          <a:bodyPr/>
+          <a:lstStyle/>
+          <a:p>
+            <a:r>
+              <a:rPr lang="en-US" dirty="0"/>
+              <a:t>Logging API</a:t>
+            </a:r>
+            <a:endParaRPr lang="bg-BG" dirty="0"/>
+          </a:p>
+        </p:txBody>
+      </p:sp>
+      <p:sp>
+        <p:nvSpPr>
+          <p:cNvPr id="3" name="Text Placeholder 2">
+            <a:extLst>
+              <a:ext uri="{FF2B5EF4-FFF2-40B4-BE49-F238E27FC236}">
+                <a16:creationId xmlns:a16="http://schemas.microsoft.com/office/drawing/2014/main" id="{7945C392-0C89-400E-BE34-79149CCE4FE0}"/>
+              </a:ext>
+            </a:extLst>
+          </p:cNvPr>
+          <p:cNvSpPr>
+            <a:spLocks noGrp="1"/>
+          </p:cNvSpPr>
+          <p:nvPr>
+            <p:ph type="body" idx="1"/>
+          </p:nvPr>
+        </p:nvSpPr>
+        <p:spPr>
+          <a:xfrm>
+            <a:off x="1729999" y="1491575"/>
+            <a:ext cx="10267447" cy="2399490"/>
+          </a:xfrm>
+        </p:spPr>
+        <p:txBody>
+          <a:bodyPr/>
+          <a:lstStyle/>
+          <a:p>
+            <a:r>
+              <a:rPr lang="en-US" dirty="0"/>
+              <a:t>Microsoft provides logging API as an extension in the wrapper </a:t>
+            </a:r>
+            <a:r>
+              <a:rPr lang="en-US" dirty="0" err="1"/>
+              <a:t>Microsoft.Extensions.Logging</a:t>
+            </a:r>
+            <a:r>
+              <a:rPr lang="en-US" dirty="0"/>
+              <a:t> which comes as a NuGet package.</a:t>
+            </a:r>
+          </a:p>
+          <a:p>
+            <a:endParaRPr lang="en-US" dirty="0"/>
+          </a:p>
+          <a:p>
+            <a:r>
+              <a:rPr lang="en-US" dirty="0" err="1"/>
+              <a:t>Microsoft.Extensions.Logging</a:t>
+            </a:r>
+            <a:r>
+              <a:rPr lang="en-US" dirty="0"/>
+              <a:t> includes the necessary classes and interfaces for logging. The most important are the </a:t>
+            </a:r>
+            <a:r>
+              <a:rPr lang="en-US" dirty="0" err="1"/>
+              <a:t>ILogger</a:t>
+            </a:r>
+            <a:r>
+              <a:rPr lang="en-US" dirty="0"/>
+              <a:t>, </a:t>
+            </a:r>
+            <a:r>
+              <a:rPr lang="en-US" dirty="0" err="1"/>
+              <a:t>ILoggerFactory</a:t>
+            </a:r>
+            <a:r>
+              <a:rPr lang="en-US" dirty="0"/>
+              <a:t>, </a:t>
+            </a:r>
+            <a:r>
+              <a:rPr lang="en-US" dirty="0" err="1"/>
+              <a:t>ILoggerProvider</a:t>
+            </a:r>
+            <a:r>
+              <a:rPr lang="en-US" dirty="0"/>
+              <a:t> interfaces and the </a:t>
+            </a:r>
+            <a:r>
+              <a:rPr lang="en-US" dirty="0" err="1"/>
+              <a:t>LoggerFactory</a:t>
+            </a:r>
+            <a:r>
+              <a:rPr lang="en-US" dirty="0"/>
+              <a:t> class.</a:t>
+            </a:r>
+          </a:p>
+          <a:p>
+            <a:endParaRPr lang="en-US" dirty="0"/>
+          </a:p>
+          <a:p>
+            <a:r>
+              <a:rPr lang="en-US" dirty="0"/>
+              <a:t>The following figure shows the relationship between logging classes.</a:t>
+            </a:r>
+            <a:endParaRPr lang="bg-BG" dirty="0"/>
+          </a:p>
+        </p:txBody>
+      </p:sp>
+      <p:pic>
+        <p:nvPicPr>
+          <p:cNvPr id="8194" name="Picture 2" descr="Logging API .NET Core">
+            <a:extLst>
+              <a:ext uri="{FF2B5EF4-FFF2-40B4-BE49-F238E27FC236}">
+                <a16:creationId xmlns:a16="http://schemas.microsoft.com/office/drawing/2014/main" id="{A0D9EF15-A789-4C0B-899A-7F1680E629B3}"/>
+              </a:ext>
+            </a:extLst>
+          </p:cNvPr>
+          <p:cNvPicPr>
+            <a:picLocks noChangeAspect="1" noChangeArrowheads="1"/>
+          </p:cNvPicPr>
+          <p:nvPr/>
+        </p:nvPicPr>
+        <p:blipFill>
+          <a:blip r:embed="rId2">
+            <a:extLst>
+              <a:ext uri="{28A0092B-C50C-407E-A947-70E740481C1C}">
+                <a14:useLocalDpi xmlns:a14="http://schemas.microsoft.com/office/drawing/2010/main" val="0"/>
+              </a:ext>
+            </a:extLst>
+          </a:blip>
+          <a:srcRect/>
+          <a:stretch>
+            <a:fillRect/>
+          </a:stretch>
+        </p:blipFill>
+        <p:spPr bwMode="auto">
+          <a:xfrm>
+            <a:off x="2323492" y="4081352"/>
+            <a:ext cx="5962650" cy="1552575"/>
+          </a:xfrm>
+          <a:prstGeom prst="rect">
+            <a:avLst/>
+          </a:prstGeom>
+          <a:noFill/>
+          <a:extLst>
+            <a:ext uri="{909E8E84-426E-40DD-AFC4-6F175D3DCCD1}">
+              <a14:hiddenFill xmlns:a14="http://schemas.microsoft.com/office/drawing/2010/main">
+                <a:solidFill>
+                  <a:srgbClr val="FFFFFF"/>
+                </a:solidFill>
+              </a14:hiddenFill>
+            </a:ext>
+          </a:extLst>
+        </p:spPr>
+      </p:pic>
+    </p:spTree>
+    <p:extLst>
+      <p:ext uri="{BB962C8B-B14F-4D97-AF65-F5344CB8AC3E}">
+        <p14:creationId xmlns:p14="http://schemas.microsoft.com/office/powerpoint/2010/main" val="4070518696"/>
+      </p:ext>
+    </p:extLst>
+  </p:cSld>
+  <p:clrMapOvr>
+    <a:masterClrMapping/>
+  </p:clrMapOvr>
+</p:sld>
+</file>
+
+<file path=ppt/slides/slide81.xml><?xml version="1.0" encoding="utf-8"?>
+<p:sld xmlns:a="http://schemas.openxmlformats.org/drawingml/2006/main" xmlns:r="http://schemas.openxmlformats.org/officeDocument/2006/relationships" xmlns:p="http://schemas.openxmlformats.org/presentationml/2006/main">
+  <p:cSld>
+    <p:spTree>
+      <p:nvGrpSpPr>
+        <p:cNvPr id="1" name=""/>
+        <p:cNvGrpSpPr/>
+        <p:nvPr/>
+      </p:nvGrpSpPr>
+      <p:grpSpPr>
+        <a:xfrm>
+          <a:off x="0" y="0"/>
+          <a:ext cx="0" cy="0"/>
+          <a:chOff x="0" y="0"/>
+          <a:chExt cx="0" cy="0"/>
+        </a:xfrm>
+      </p:grpSpPr>
+      <p:sp>
+        <p:nvSpPr>
+          <p:cNvPr id="2" name="Title 1">
+            <a:extLst>
+              <a:ext uri="{FF2B5EF4-FFF2-40B4-BE49-F238E27FC236}">
+                <a16:creationId xmlns:a16="http://schemas.microsoft.com/office/drawing/2014/main" id="{FEF181DB-DD45-40D5-90F2-ACE64B9C8AE4}"/>
+              </a:ext>
+            </a:extLst>
+          </p:cNvPr>
+          <p:cNvSpPr>
+            <a:spLocks noGrp="1"/>
+          </p:cNvSpPr>
+          <p:nvPr>
+            <p:ph type="title"/>
+          </p:nvPr>
+        </p:nvSpPr>
+        <p:spPr/>
+        <p:txBody>
+          <a:bodyPr/>
+          <a:lstStyle/>
+          <a:p>
+            <a:r>
+              <a:rPr lang="en-US" dirty="0"/>
+              <a:t>Logging in ASP.NET Core</a:t>
+            </a:r>
+            <a:endParaRPr lang="bg-BG" dirty="0"/>
+          </a:p>
+        </p:txBody>
+      </p:sp>
+      <p:sp>
+        <p:nvSpPr>
+          <p:cNvPr id="3" name="Text Placeholder 2">
+            <a:extLst>
+              <a:ext uri="{FF2B5EF4-FFF2-40B4-BE49-F238E27FC236}">
+                <a16:creationId xmlns:a16="http://schemas.microsoft.com/office/drawing/2014/main" id="{15722782-0F9B-4E70-A154-90ABDF341A75}"/>
+              </a:ext>
+            </a:extLst>
+          </p:cNvPr>
+          <p:cNvSpPr>
+            <a:spLocks noGrp="1"/>
+          </p:cNvSpPr>
+          <p:nvPr>
+            <p:ph type="body" idx="1"/>
+          </p:nvPr>
+        </p:nvSpPr>
+        <p:spPr/>
+        <p:txBody>
+          <a:bodyPr/>
+          <a:lstStyle/>
+          <a:p>
+            <a:r>
+              <a:rPr lang="en-US" dirty="0"/>
+              <a:t>When you create the ASP.NET Core MVC web application in Visual Studio 2017 (or later), it automatically includes the NuGet package for </a:t>
+            </a:r>
+            <a:r>
+              <a:rPr lang="en-US" dirty="0" err="1"/>
+              <a:t>Microsoft.Extensions.Logging</a:t>
+            </a:r>
+            <a:r>
+              <a:rPr lang="en-US" dirty="0"/>
+              <a:t> and the following logging providers under the </a:t>
+            </a:r>
+            <a:r>
+              <a:rPr lang="en-US" dirty="0" err="1"/>
+              <a:t>Microsoft.AspNetCore.App</a:t>
+            </a:r>
+            <a:r>
+              <a:rPr lang="en-US" dirty="0"/>
+              <a:t> NuGet package. So, we don't have to install it manually.</a:t>
+            </a:r>
+          </a:p>
+          <a:p>
+            <a:endParaRPr lang="en-US" dirty="0"/>
+          </a:p>
+          <a:p>
+            <a:pPr lvl="1"/>
+            <a:r>
+              <a:rPr lang="en-US" dirty="0" err="1"/>
+              <a:t>Microsoft.Extensions.Logging.Console</a:t>
+            </a:r>
+            <a:endParaRPr lang="en-US" dirty="0"/>
+          </a:p>
+          <a:p>
+            <a:pPr lvl="1"/>
+            <a:r>
+              <a:rPr lang="en-US" dirty="0" err="1"/>
+              <a:t>Microsoft.Extensions.Logging.Debug</a:t>
+            </a:r>
+            <a:endParaRPr lang="en-US" dirty="0"/>
+          </a:p>
+          <a:p>
+            <a:pPr lvl="1"/>
+            <a:r>
+              <a:rPr lang="en-US" dirty="0" err="1"/>
+              <a:t>Microsoft.Extensions.Logging.EventSource</a:t>
+            </a:r>
+            <a:endParaRPr lang="en-US" dirty="0"/>
+          </a:p>
+          <a:p>
+            <a:pPr lvl="1"/>
+            <a:r>
+              <a:rPr lang="en-US" dirty="0" err="1"/>
+              <a:t>Microsoft.Extensions.Logging.TraceSource</a:t>
+            </a:r>
+            <a:endParaRPr lang="bg-BG" dirty="0"/>
+          </a:p>
+        </p:txBody>
+      </p:sp>
+    </p:spTree>
+    <p:extLst>
+      <p:ext uri="{BB962C8B-B14F-4D97-AF65-F5344CB8AC3E}">
+        <p14:creationId xmlns:p14="http://schemas.microsoft.com/office/powerpoint/2010/main" val="2394448888"/>
+      </p:ext>
+    </p:extLst>
+  </p:cSld>
+  <p:clrMapOvr>
+    <a:masterClrMapping/>
+  </p:clrMapOvr>
+</p:sld>
+</file>
+
+<file path=ppt/slides/slide82.xml><?xml version="1.0" encoding="utf-8"?>
+<p:sld xmlns:a="http://schemas.openxmlformats.org/drawingml/2006/main" xmlns:r="http://schemas.openxmlformats.org/officeDocument/2006/relationships" xmlns:p="http://schemas.openxmlformats.org/presentationml/2006/main">
+  <p:cSld>
+    <p:spTree>
+      <p:nvGrpSpPr>
+        <p:cNvPr id="1" name=""/>
+        <p:cNvGrpSpPr/>
+        <p:nvPr/>
+      </p:nvGrpSpPr>
+      <p:grpSpPr>
+        <a:xfrm>
+          <a:off x="0" y="0"/>
+          <a:ext cx="0" cy="0"/>
+          <a:chOff x="0" y="0"/>
+          <a:chExt cx="0" cy="0"/>
+        </a:xfrm>
+      </p:grpSpPr>
+      <p:sp>
+        <p:nvSpPr>
+          <p:cNvPr id="2" name="Title 1">
+            <a:extLst>
+              <a:ext uri="{FF2B5EF4-FFF2-40B4-BE49-F238E27FC236}">
+                <a16:creationId xmlns:a16="http://schemas.microsoft.com/office/drawing/2014/main" id="{5DCC418B-733E-455F-B56B-1E5B5AC5B105}"/>
+              </a:ext>
+            </a:extLst>
+          </p:cNvPr>
+          <p:cNvSpPr>
+            <a:spLocks noGrp="1"/>
+          </p:cNvSpPr>
+          <p:nvPr>
+            <p:ph type="title"/>
+          </p:nvPr>
+        </p:nvSpPr>
+        <p:spPr/>
+        <p:txBody>
+          <a:bodyPr/>
+          <a:lstStyle/>
+          <a:p>
+            <a:r>
+              <a:rPr lang="en-US" dirty="0"/>
+              <a:t>Add Logging Providers</a:t>
+            </a:r>
+            <a:endParaRPr lang="bg-BG" dirty="0"/>
+          </a:p>
+        </p:txBody>
+      </p:sp>
+      <p:sp>
+        <p:nvSpPr>
+          <p:cNvPr id="3" name="Text Placeholder 2">
+            <a:extLst>
+              <a:ext uri="{FF2B5EF4-FFF2-40B4-BE49-F238E27FC236}">
+                <a16:creationId xmlns:a16="http://schemas.microsoft.com/office/drawing/2014/main" id="{F8C60698-53BB-4693-A026-B7D4999C016E}"/>
+              </a:ext>
+            </a:extLst>
+          </p:cNvPr>
+          <p:cNvSpPr>
+            <a:spLocks noGrp="1"/>
+          </p:cNvSpPr>
+          <p:nvPr>
+            <p:ph type="body" idx="1"/>
+          </p:nvPr>
+        </p:nvSpPr>
+        <p:spPr>
+          <a:xfrm>
+            <a:off x="1729999" y="1660187"/>
+            <a:ext cx="10118289" cy="2042809"/>
+          </a:xfrm>
+        </p:spPr>
+        <p:txBody>
+          <a:bodyPr/>
+          <a:lstStyle/>
+          <a:p>
+            <a:r>
+              <a:rPr lang="en-US" dirty="0"/>
+              <a:t>In the ASP.NET Core MVC application, the call to the </a:t>
+            </a:r>
+            <a:r>
+              <a:rPr lang="en-US" dirty="0" err="1"/>
+              <a:t>WebHost.CreateDefaultBuilder</a:t>
+            </a:r>
+            <a:r>
+              <a:rPr lang="en-US" dirty="0"/>
+              <a:t>(</a:t>
+            </a:r>
+            <a:r>
+              <a:rPr lang="en-US" dirty="0" err="1"/>
+              <a:t>args</a:t>
+            </a:r>
+            <a:r>
+              <a:rPr lang="en-US" dirty="0"/>
+              <a:t>) method in the </a:t>
+            </a:r>
+            <a:r>
+              <a:rPr lang="en-US" dirty="0" err="1"/>
+              <a:t>Program.cs</a:t>
+            </a:r>
+            <a:r>
+              <a:rPr lang="en-US" dirty="0"/>
+              <a:t> internally adds the Console, Debug, and </a:t>
+            </a:r>
+            <a:r>
+              <a:rPr lang="en-US" dirty="0" err="1"/>
+              <a:t>EventSource</a:t>
+            </a:r>
+            <a:r>
+              <a:rPr lang="en-US" dirty="0"/>
+              <a:t> logging providers.</a:t>
+            </a:r>
+            <a:endParaRPr lang="bg-BG" dirty="0"/>
+          </a:p>
+          <a:p>
+            <a:r>
+              <a:rPr lang="en-US" dirty="0"/>
+              <a:t>Thus, if you want to use these providers, no need to add them manually. If you want to use other providers or any default provider, then you need to remove all the existing providers and add the provider of your choice. To configure logging providers, call the </a:t>
+            </a:r>
+            <a:r>
+              <a:rPr lang="en-US" dirty="0" err="1"/>
+              <a:t>ConfigureLogging</a:t>
+            </a:r>
+            <a:r>
+              <a:rPr lang="en-US" dirty="0"/>
+              <a:t>() extension method of </a:t>
+            </a:r>
+            <a:r>
+              <a:rPr lang="en-US" dirty="0" err="1"/>
+              <a:t>IWebHostBuilder</a:t>
+            </a:r>
+            <a:r>
+              <a:rPr lang="en-US" dirty="0"/>
+              <a:t>.</a:t>
+            </a:r>
+            <a:endParaRPr lang="bg-BG" dirty="0"/>
+          </a:p>
+        </p:txBody>
+      </p:sp>
+      <p:pic>
+        <p:nvPicPr>
+          <p:cNvPr id="5" name="Picture 4">
+            <a:extLst>
+              <a:ext uri="{FF2B5EF4-FFF2-40B4-BE49-F238E27FC236}">
+                <a16:creationId xmlns:a16="http://schemas.microsoft.com/office/drawing/2014/main" id="{01312F6A-0E1C-45D1-8E59-E708E31F554C}"/>
+              </a:ext>
+            </a:extLst>
+          </p:cNvPr>
+          <p:cNvPicPr>
+            <a:picLocks noChangeAspect="1"/>
+          </p:cNvPicPr>
+          <p:nvPr/>
+        </p:nvPicPr>
+        <p:blipFill>
+          <a:blip r:embed="rId2"/>
+          <a:stretch>
+            <a:fillRect/>
+          </a:stretch>
+        </p:blipFill>
+        <p:spPr>
+          <a:xfrm>
+            <a:off x="2313459" y="3910520"/>
+            <a:ext cx="7194441" cy="1750168"/>
+          </a:xfrm>
+          <a:prstGeom prst="rect">
+            <a:avLst/>
+          </a:prstGeom>
+        </p:spPr>
+      </p:pic>
+    </p:spTree>
+    <p:extLst>
+      <p:ext uri="{BB962C8B-B14F-4D97-AF65-F5344CB8AC3E}">
+        <p14:creationId xmlns:p14="http://schemas.microsoft.com/office/powerpoint/2010/main" val="2944378116"/>
+      </p:ext>
+    </p:extLst>
+  </p:cSld>
+  <p:clrMapOvr>
+    <a:masterClrMapping/>
+  </p:clrMapOvr>
+</p:sld>
+</file>
+
+<file path=ppt/slides/slide83.xml><?xml version="1.0" encoding="utf-8"?>
+<p:sld xmlns:a="http://schemas.openxmlformats.org/drawingml/2006/main" xmlns:r="http://schemas.openxmlformats.org/officeDocument/2006/relationships" xmlns:p="http://schemas.openxmlformats.org/presentationml/2006/main">
+  <p:cSld>
+    <p:spTree>
+      <p:nvGrpSpPr>
+        <p:cNvPr id="1" name=""/>
+        <p:cNvGrpSpPr/>
+        <p:nvPr/>
+      </p:nvGrpSpPr>
+      <p:grpSpPr>
+        <a:xfrm>
+          <a:off x="0" y="0"/>
+          <a:ext cx="0" cy="0"/>
+          <a:chOff x="0" y="0"/>
+          <a:chExt cx="0" cy="0"/>
+        </a:xfrm>
+      </p:grpSpPr>
+      <p:sp>
+        <p:nvSpPr>
+          <p:cNvPr id="2" name="Title 1">
+            <a:extLst>
+              <a:ext uri="{FF2B5EF4-FFF2-40B4-BE49-F238E27FC236}">
+                <a16:creationId xmlns:a16="http://schemas.microsoft.com/office/drawing/2014/main" id="{040E1093-687D-4D03-9C69-6EF9766EE0E6}"/>
+              </a:ext>
+            </a:extLst>
+          </p:cNvPr>
+          <p:cNvSpPr>
+            <a:spLocks noGrp="1"/>
+          </p:cNvSpPr>
+          <p:nvPr>
+            <p:ph type="title"/>
+          </p:nvPr>
+        </p:nvSpPr>
+        <p:spPr/>
+        <p:txBody>
+          <a:bodyPr/>
+          <a:lstStyle/>
+          <a:p>
+            <a:r>
+              <a:rPr lang="en-US" dirty="0"/>
+              <a:t>Store Logs in a Text File</a:t>
+            </a:r>
+            <a:endParaRPr lang="bg-BG" dirty="0"/>
+          </a:p>
+        </p:txBody>
+      </p:sp>
+      <p:sp>
+        <p:nvSpPr>
+          <p:cNvPr id="3" name="Text Placeholder 2">
+            <a:extLst>
+              <a:ext uri="{FF2B5EF4-FFF2-40B4-BE49-F238E27FC236}">
+                <a16:creationId xmlns:a16="http://schemas.microsoft.com/office/drawing/2014/main" id="{EB51F313-46AE-48C9-8B8B-0CF968EE1A9C}"/>
+              </a:ext>
+            </a:extLst>
+          </p:cNvPr>
+          <p:cNvSpPr>
+            <a:spLocks noGrp="1"/>
+          </p:cNvSpPr>
+          <p:nvPr>
+            <p:ph type="body" idx="1"/>
+          </p:nvPr>
+        </p:nvSpPr>
+        <p:spPr>
+          <a:xfrm>
+            <a:off x="1730000" y="1303506"/>
+            <a:ext cx="10241506" cy="4668261"/>
+          </a:xfrm>
+        </p:spPr>
+        <p:txBody>
+          <a:bodyPr/>
+          <a:lstStyle/>
+          <a:p>
+            <a:r>
+              <a:rPr lang="en-US" dirty="0"/>
+              <a:t>To store logs in a file, install the NuGet package </a:t>
+            </a:r>
+            <a:r>
+              <a:rPr lang="en-US" dirty="0" err="1"/>
+              <a:t>Serilog.Extensions.Logging.File</a:t>
+            </a:r>
+            <a:r>
+              <a:rPr lang="en-US" dirty="0"/>
+              <a:t>. </a:t>
+            </a:r>
+          </a:p>
+          <a:p>
+            <a:endParaRPr lang="en-US" dirty="0"/>
+          </a:p>
+          <a:p>
+            <a:r>
+              <a:rPr lang="en-US" dirty="0" err="1"/>
+              <a:t>Serillog</a:t>
+            </a:r>
+            <a:r>
+              <a:rPr lang="en-US" dirty="0"/>
+              <a:t> includes an extension method for </a:t>
+            </a:r>
+            <a:r>
+              <a:rPr lang="en-US" dirty="0" err="1"/>
+              <a:t>ILoggerFactory</a:t>
+            </a:r>
+            <a:r>
+              <a:rPr lang="en-US" dirty="0"/>
+              <a:t> but not for </a:t>
+            </a:r>
+            <a:r>
+              <a:rPr lang="en-US" dirty="0" err="1"/>
+              <a:t>ILogBuilder</a:t>
+            </a:r>
+            <a:r>
+              <a:rPr lang="en-US" dirty="0"/>
+              <a:t> (in v 1.1.0). </a:t>
+            </a:r>
+          </a:p>
+          <a:p>
+            <a:endParaRPr lang="en-US" dirty="0"/>
+          </a:p>
+          <a:p>
+            <a:r>
+              <a:rPr lang="en-US" dirty="0"/>
+              <a:t>So, go to the </a:t>
+            </a:r>
+            <a:r>
+              <a:rPr lang="en-US" dirty="0" err="1"/>
+              <a:t>Startup.cs</a:t>
+            </a:r>
+            <a:r>
+              <a:rPr lang="en-US" dirty="0"/>
+              <a:t> file and add the </a:t>
+            </a:r>
+            <a:r>
+              <a:rPr lang="en-US" dirty="0" err="1"/>
+              <a:t>ILoggerFactory</a:t>
+            </a:r>
+            <a:r>
+              <a:rPr lang="en-US" dirty="0"/>
+              <a:t> parameter in the Configure() method. </a:t>
+            </a:r>
+          </a:p>
+          <a:p>
+            <a:endParaRPr lang="en-US" dirty="0"/>
+          </a:p>
+          <a:p>
+            <a:r>
+              <a:rPr lang="en-US" dirty="0"/>
+              <a:t>Then, call the </a:t>
+            </a:r>
+            <a:r>
+              <a:rPr lang="en-US" dirty="0" err="1"/>
+              <a:t>AddFile</a:t>
+            </a:r>
+            <a:r>
+              <a:rPr lang="en-US" dirty="0"/>
+              <a:t>() extension method to add </a:t>
+            </a:r>
+            <a:r>
+              <a:rPr lang="en-US" dirty="0" err="1"/>
+              <a:t>Serillog</a:t>
+            </a:r>
+            <a:r>
+              <a:rPr lang="en-US" dirty="0"/>
+              <a:t> file provider, as shown below. </a:t>
+            </a:r>
+          </a:p>
+          <a:p>
+            <a:endParaRPr lang="en-US" dirty="0"/>
+          </a:p>
+          <a:p>
+            <a:r>
+              <a:rPr lang="en-US" dirty="0"/>
+              <a:t>ASP.NET Core dependency injection will automatically pass an instance of the </a:t>
+            </a:r>
+            <a:r>
+              <a:rPr lang="en-US" dirty="0" err="1"/>
+              <a:t>LoggerFactory</a:t>
+            </a:r>
+            <a:r>
+              <a:rPr lang="en-US" dirty="0"/>
+              <a:t> for this parameter.</a:t>
+            </a:r>
+          </a:p>
+          <a:p>
+            <a:endParaRPr lang="en-US" dirty="0"/>
+          </a:p>
+          <a:p>
+            <a:r>
+              <a:rPr lang="en-US" dirty="0"/>
+              <a:t>This will store all the logs in the </a:t>
+            </a:r>
+            <a:r>
+              <a:rPr lang="en-US" dirty="0" err="1"/>
+              <a:t>mylog</a:t>
+            </a:r>
+            <a:r>
+              <a:rPr lang="en-US" dirty="0"/>
+              <a:t>-&lt;date&gt;.txt file, under the Logs folder in your application.</a:t>
+            </a:r>
+          </a:p>
+          <a:p>
+            <a:endParaRPr lang="en-US" dirty="0"/>
+          </a:p>
+          <a:p>
+            <a:endParaRPr lang="bg-BG" dirty="0"/>
+          </a:p>
+        </p:txBody>
+      </p:sp>
+      <p:pic>
+        <p:nvPicPr>
+          <p:cNvPr id="5" name="Picture 4">
+            <a:extLst>
+              <a:ext uri="{FF2B5EF4-FFF2-40B4-BE49-F238E27FC236}">
+                <a16:creationId xmlns:a16="http://schemas.microsoft.com/office/drawing/2014/main" id="{86DE461C-A4CF-490A-B781-CF0782147032}"/>
+              </a:ext>
+            </a:extLst>
+          </p:cNvPr>
+          <p:cNvPicPr>
+            <a:picLocks noChangeAspect="1"/>
+          </p:cNvPicPr>
+          <p:nvPr/>
+        </p:nvPicPr>
+        <p:blipFill>
+          <a:blip r:embed="rId2"/>
+          <a:stretch>
+            <a:fillRect/>
+          </a:stretch>
+        </p:blipFill>
+        <p:spPr>
+          <a:xfrm>
+            <a:off x="2721080" y="5378629"/>
+            <a:ext cx="7403039" cy="1065091"/>
+          </a:xfrm>
+          <a:prstGeom prst="rect">
+            <a:avLst/>
+          </a:prstGeom>
+        </p:spPr>
+      </p:pic>
+    </p:spTree>
+    <p:extLst>
+      <p:ext uri="{BB962C8B-B14F-4D97-AF65-F5344CB8AC3E}">
+        <p14:creationId xmlns:p14="http://schemas.microsoft.com/office/powerpoint/2010/main" val="305997951"/>
+      </p:ext>
+    </p:extLst>
+  </p:cSld>
+  <p:clrMapOvr>
+    <a:masterClrMapping/>
+  </p:clrMapOvr>
+</p:sld>
+</file>
+
+<file path=ppt/slides/slide84.xml><?xml version="1.0" encoding="utf-8"?>
+<p:sld xmlns:a="http://schemas.openxmlformats.org/drawingml/2006/main" xmlns:r="http://schemas.openxmlformats.org/officeDocument/2006/relationships" xmlns:p="http://schemas.openxmlformats.org/presentationml/2006/main">
+  <p:cSld>
+    <p:spTree>
+      <p:nvGrpSpPr>
+        <p:cNvPr id="1" name=""/>
+        <p:cNvGrpSpPr/>
+        <p:nvPr/>
+      </p:nvGrpSpPr>
+      <p:grpSpPr>
+        <a:xfrm>
+          <a:off x="0" y="0"/>
+          <a:ext cx="0" cy="0"/>
+          <a:chOff x="0" y="0"/>
+          <a:chExt cx="0" cy="0"/>
+        </a:xfrm>
+      </p:grpSpPr>
+      <p:sp>
+        <p:nvSpPr>
+          <p:cNvPr id="2" name="Title 1">
+            <a:extLst>
+              <a:ext uri="{FF2B5EF4-FFF2-40B4-BE49-F238E27FC236}">
+                <a16:creationId xmlns:a16="http://schemas.microsoft.com/office/drawing/2014/main" id="{94D20C31-D401-4B0B-8D7F-DBB72F116FE5}"/>
+              </a:ext>
+            </a:extLst>
+          </p:cNvPr>
+          <p:cNvSpPr>
+            <a:spLocks noGrp="1"/>
+          </p:cNvSpPr>
+          <p:nvPr>
+            <p:ph type="title"/>
+          </p:nvPr>
+        </p:nvSpPr>
+        <p:spPr/>
+        <p:txBody>
+          <a:bodyPr/>
+          <a:lstStyle/>
+          <a:p>
+            <a:r>
+              <a:rPr lang="en-US" dirty="0"/>
+              <a:t>Create Logs in the Controller</a:t>
+            </a:r>
+            <a:endParaRPr lang="bg-BG" dirty="0"/>
+          </a:p>
+        </p:txBody>
+      </p:sp>
+      <p:sp>
+        <p:nvSpPr>
+          <p:cNvPr id="3" name="Text Placeholder 2">
+            <a:extLst>
+              <a:ext uri="{FF2B5EF4-FFF2-40B4-BE49-F238E27FC236}">
+                <a16:creationId xmlns:a16="http://schemas.microsoft.com/office/drawing/2014/main" id="{23C35BE5-512A-4315-9965-6E328B1F7FE4}"/>
+              </a:ext>
+            </a:extLst>
+          </p:cNvPr>
+          <p:cNvSpPr>
+            <a:spLocks noGrp="1"/>
+          </p:cNvSpPr>
+          <p:nvPr>
+            <p:ph type="body" idx="1"/>
+          </p:nvPr>
+        </p:nvSpPr>
+        <p:spPr>
+          <a:xfrm>
+            <a:off x="1730000" y="1426723"/>
+            <a:ext cx="9385200" cy="862520"/>
+          </a:xfrm>
+        </p:spPr>
+        <p:txBody>
+          <a:bodyPr/>
+          <a:lstStyle/>
+          <a:p>
+            <a:r>
+              <a:rPr lang="en-US" dirty="0"/>
+              <a:t>We can use </a:t>
+            </a:r>
+            <a:r>
+              <a:rPr lang="en-US" dirty="0" err="1"/>
+              <a:t>ILogger</a:t>
+            </a:r>
+            <a:r>
+              <a:rPr lang="en-US" dirty="0"/>
+              <a:t> or </a:t>
+            </a:r>
+            <a:r>
+              <a:rPr lang="en-US" dirty="0" err="1"/>
+              <a:t>ILoggerFactory</a:t>
+            </a:r>
+            <a:r>
+              <a:rPr lang="en-US" dirty="0"/>
+              <a:t> anywhere in an application using ASP.NET Core DI (Dependency Injection). Consider the following example of </a:t>
+            </a:r>
+            <a:r>
+              <a:rPr lang="en-US" dirty="0" err="1"/>
+              <a:t>HomeController</a:t>
+            </a:r>
+            <a:r>
+              <a:rPr lang="en-US" dirty="0"/>
+              <a:t>:</a:t>
+            </a:r>
+            <a:endParaRPr lang="bg-BG" dirty="0"/>
+          </a:p>
+        </p:txBody>
+      </p:sp>
+      <p:pic>
+        <p:nvPicPr>
+          <p:cNvPr id="5" name="Picture 4">
+            <a:extLst>
+              <a:ext uri="{FF2B5EF4-FFF2-40B4-BE49-F238E27FC236}">
+                <a16:creationId xmlns:a16="http://schemas.microsoft.com/office/drawing/2014/main" id="{1AB009B4-36C3-447B-9024-FA224827E548}"/>
+              </a:ext>
+            </a:extLst>
+          </p:cNvPr>
+          <p:cNvPicPr>
+            <a:picLocks noChangeAspect="1"/>
+          </p:cNvPicPr>
+          <p:nvPr/>
+        </p:nvPicPr>
+        <p:blipFill>
+          <a:blip r:embed="rId2"/>
+          <a:stretch>
+            <a:fillRect/>
+          </a:stretch>
+        </p:blipFill>
+        <p:spPr>
+          <a:xfrm>
+            <a:off x="2316298" y="2268372"/>
+            <a:ext cx="5258306" cy="4064628"/>
+          </a:xfrm>
+          <a:prstGeom prst="rect">
+            <a:avLst/>
+          </a:prstGeom>
+        </p:spPr>
+      </p:pic>
+    </p:spTree>
+    <p:extLst>
+      <p:ext uri="{BB962C8B-B14F-4D97-AF65-F5344CB8AC3E}">
+        <p14:creationId xmlns:p14="http://schemas.microsoft.com/office/powerpoint/2010/main" val="2424093670"/>
+      </p:ext>
+    </p:extLst>
+  </p:cSld>
+  <p:clrMapOvr>
+    <a:masterClrMapping/>
+  </p:clrMapOvr>
+</p:sld>
+</file>
+
+<file path=ppt/slides/slide85.xml><?xml version="1.0" encoding="utf-8"?>
+<p:sld xmlns:a="http://schemas.openxmlformats.org/drawingml/2006/main" xmlns:r="http://schemas.openxmlformats.org/officeDocument/2006/relationships" xmlns:p="http://schemas.openxmlformats.org/presentationml/2006/main">
+  <p:cSld>
+    <p:spTree>
+      <p:nvGrpSpPr>
+        <p:cNvPr id="1" name=""/>
+        <p:cNvGrpSpPr/>
+        <p:nvPr/>
+      </p:nvGrpSpPr>
+      <p:grpSpPr>
+        <a:xfrm>
+          <a:off x="0" y="0"/>
+          <a:ext cx="0" cy="0"/>
+          <a:chOff x="0" y="0"/>
+          <a:chExt cx="0" cy="0"/>
+        </a:xfrm>
+      </p:grpSpPr>
+      <p:sp>
+        <p:nvSpPr>
+          <p:cNvPr id="2" name="Title 1">
+            <a:extLst>
+              <a:ext uri="{FF2B5EF4-FFF2-40B4-BE49-F238E27FC236}">
+                <a16:creationId xmlns:a16="http://schemas.microsoft.com/office/drawing/2014/main" id="{EBBBD9CF-DEA4-4929-8EF1-610C71D7F429}"/>
+              </a:ext>
+            </a:extLst>
+          </p:cNvPr>
+          <p:cNvSpPr>
+            <a:spLocks noGrp="1"/>
+          </p:cNvSpPr>
+          <p:nvPr>
+            <p:ph type="title"/>
+          </p:nvPr>
+        </p:nvSpPr>
+        <p:spPr/>
+        <p:txBody>
+          <a:bodyPr/>
+          <a:lstStyle/>
+          <a:p>
+            <a:r>
+              <a:rPr lang="en-US" dirty="0"/>
+              <a:t>Create Logs in the Controller</a:t>
+            </a:r>
+            <a:endParaRPr lang="bg-BG" dirty="0"/>
+          </a:p>
+        </p:txBody>
+      </p:sp>
+      <p:sp>
+        <p:nvSpPr>
+          <p:cNvPr id="3" name="Text Placeholder 2">
+            <a:extLst>
+              <a:ext uri="{FF2B5EF4-FFF2-40B4-BE49-F238E27FC236}">
+                <a16:creationId xmlns:a16="http://schemas.microsoft.com/office/drawing/2014/main" id="{3DEBDA7F-E06C-426D-BAE1-A3646E507C01}"/>
+              </a:ext>
+            </a:extLst>
+          </p:cNvPr>
+          <p:cNvSpPr>
+            <a:spLocks noGrp="1"/>
+          </p:cNvSpPr>
+          <p:nvPr>
+            <p:ph type="body" idx="1"/>
+          </p:nvPr>
+        </p:nvSpPr>
+        <p:spPr/>
+        <p:txBody>
+          <a:bodyPr/>
+          <a:lstStyle/>
+          <a:p>
+            <a:r>
+              <a:rPr lang="en-US" dirty="0"/>
+              <a:t>In the above example, the </a:t>
+            </a:r>
+            <a:r>
+              <a:rPr lang="en-US" dirty="0" err="1">
+                <a:solidFill>
+                  <a:schemeClr val="accent1">
+                    <a:lumMod val="60000"/>
+                    <a:lumOff val="40000"/>
+                  </a:schemeClr>
+                </a:solidFill>
+              </a:rPr>
+              <a:t>ILogger</a:t>
+            </a:r>
+            <a:r>
+              <a:rPr lang="en-US" dirty="0">
+                <a:solidFill>
+                  <a:schemeClr val="accent1">
+                    <a:lumMod val="60000"/>
+                    <a:lumOff val="40000"/>
+                  </a:schemeClr>
+                </a:solidFill>
+              </a:rPr>
+              <a:t>&lt;</a:t>
+            </a:r>
+            <a:r>
+              <a:rPr lang="en-US" dirty="0" err="1">
+                <a:solidFill>
+                  <a:schemeClr val="accent1">
+                    <a:lumMod val="60000"/>
+                    <a:lumOff val="40000"/>
+                  </a:schemeClr>
+                </a:solidFill>
+              </a:rPr>
+              <a:t>HomeController</a:t>
+            </a:r>
+            <a:r>
+              <a:rPr lang="en-US" dirty="0">
+                <a:solidFill>
+                  <a:schemeClr val="accent1">
+                    <a:lumMod val="60000"/>
+                    <a:lumOff val="40000"/>
+                  </a:schemeClr>
+                </a:solidFill>
+              </a:rPr>
+              <a:t>&gt; </a:t>
+            </a:r>
+            <a:r>
+              <a:rPr lang="en-US" dirty="0"/>
+              <a:t>parameter is included in the constructor. ASP.NET Core DI will pass the </a:t>
+            </a:r>
+            <a:r>
+              <a:rPr lang="en-US" dirty="0" err="1"/>
+              <a:t>ILogger</a:t>
+            </a:r>
+            <a:r>
+              <a:rPr lang="en-US" dirty="0"/>
+              <a:t> instance, which can be used to log in the Index() and About() action methods.</a:t>
+            </a:r>
+          </a:p>
+          <a:p>
+            <a:endParaRPr lang="en-US" dirty="0"/>
+          </a:p>
+          <a:p>
+            <a:r>
+              <a:rPr lang="en-US" dirty="0"/>
+              <a:t>Passing </a:t>
+            </a:r>
+            <a:r>
+              <a:rPr lang="en-US" dirty="0" err="1">
+                <a:solidFill>
+                  <a:schemeClr val="accent1">
+                    <a:lumMod val="60000"/>
+                    <a:lumOff val="40000"/>
+                  </a:schemeClr>
+                </a:solidFill>
+              </a:rPr>
+              <a:t>HomeController</a:t>
+            </a:r>
+            <a:r>
+              <a:rPr lang="en-US" dirty="0"/>
+              <a:t> as generic type for the </a:t>
+            </a:r>
+            <a:r>
+              <a:rPr lang="en-US" dirty="0" err="1"/>
+              <a:t>ILogger</a:t>
+            </a:r>
+            <a:r>
+              <a:rPr lang="en-US" dirty="0"/>
+              <a:t>&lt;</a:t>
+            </a:r>
+            <a:r>
+              <a:rPr lang="en-US" dirty="0" err="1"/>
+              <a:t>HomeController</a:t>
+            </a:r>
+            <a:r>
+              <a:rPr lang="en-US" dirty="0"/>
+              <a:t>&gt;, will be used as a </a:t>
+            </a:r>
+            <a:r>
+              <a:rPr lang="en-US" dirty="0">
+                <a:solidFill>
+                  <a:schemeClr val="accent1">
+                    <a:lumMod val="60000"/>
+                    <a:lumOff val="40000"/>
+                  </a:schemeClr>
+                </a:solidFill>
+              </a:rPr>
+              <a:t>category</a:t>
+            </a:r>
+            <a:r>
+              <a:rPr lang="en-US" dirty="0"/>
+              <a:t>. For example, specifying </a:t>
+            </a:r>
+            <a:r>
+              <a:rPr lang="en-US" dirty="0" err="1"/>
+              <a:t>ILogger</a:t>
+            </a:r>
+            <a:r>
+              <a:rPr lang="en-US" dirty="0"/>
+              <a:t>&lt;</a:t>
+            </a:r>
+            <a:r>
+              <a:rPr lang="en-US" dirty="0" err="1"/>
+              <a:t>HomeController</a:t>
+            </a:r>
+            <a:r>
+              <a:rPr lang="en-US" dirty="0"/>
+              <a:t>&lt; will display a fully qualified name </a:t>
+            </a:r>
+            <a:r>
+              <a:rPr lang="en-US" dirty="0" err="1"/>
+              <a:t>AspDotNetCoreMvcApp.Controllers.HomeController</a:t>
+            </a:r>
+            <a:r>
+              <a:rPr lang="en-US" dirty="0"/>
+              <a:t> in the logs, as shown below.</a:t>
+            </a:r>
+            <a:endParaRPr lang="bg-BG" dirty="0"/>
+          </a:p>
+        </p:txBody>
+      </p:sp>
+    </p:spTree>
+    <p:extLst>
+      <p:ext uri="{BB962C8B-B14F-4D97-AF65-F5344CB8AC3E}">
+        <p14:creationId xmlns:p14="http://schemas.microsoft.com/office/powerpoint/2010/main" val="2674968631"/>
+      </p:ext>
+    </p:extLst>
+  </p:cSld>
+  <p:clrMapOvr>
+    <a:masterClrMapping/>
+  </p:clrMapOvr>
+</p:sld>
+</file>
+
+<file path=ppt/slides/slide86.xml><?xml version="1.0" encoding="utf-8"?>
+<p:sld xmlns:a="http://schemas.openxmlformats.org/drawingml/2006/main" xmlns:r="http://schemas.openxmlformats.org/officeDocument/2006/relationships" xmlns:p="http://schemas.openxmlformats.org/presentationml/2006/main">
+  <p:cSld>
+    <p:spTree>
+      <p:nvGrpSpPr>
+        <p:cNvPr id="1" name=""/>
+        <p:cNvGrpSpPr/>
+        <p:nvPr/>
+      </p:nvGrpSpPr>
+      <p:grpSpPr>
+        <a:xfrm>
+          <a:off x="0" y="0"/>
+          <a:ext cx="0" cy="0"/>
+          <a:chOff x="0" y="0"/>
+          <a:chExt cx="0" cy="0"/>
+        </a:xfrm>
+      </p:grpSpPr>
+      <p:sp>
+        <p:nvSpPr>
+          <p:cNvPr id="2" name="Title 1">
+            <a:extLst>
+              <a:ext uri="{FF2B5EF4-FFF2-40B4-BE49-F238E27FC236}">
+                <a16:creationId xmlns:a16="http://schemas.microsoft.com/office/drawing/2014/main" id="{6C32E442-824C-43B2-A0C5-0F1AB16D2C04}"/>
+              </a:ext>
+            </a:extLst>
+          </p:cNvPr>
+          <p:cNvSpPr>
+            <a:spLocks noGrp="1"/>
+          </p:cNvSpPr>
+          <p:nvPr>
+            <p:ph type="title"/>
+          </p:nvPr>
+        </p:nvSpPr>
+        <p:spPr/>
+        <p:txBody>
+          <a:bodyPr/>
+          <a:lstStyle/>
+          <a:p>
+            <a:endParaRPr lang="bg-BG"/>
+          </a:p>
+        </p:txBody>
+      </p:sp>
+      <p:sp>
+        <p:nvSpPr>
+          <p:cNvPr id="3" name="Text Placeholder 2">
+            <a:extLst>
+              <a:ext uri="{FF2B5EF4-FFF2-40B4-BE49-F238E27FC236}">
+                <a16:creationId xmlns:a16="http://schemas.microsoft.com/office/drawing/2014/main" id="{F5992277-06BB-494C-AA86-0C5D366C1C70}"/>
+              </a:ext>
+            </a:extLst>
+          </p:cNvPr>
+          <p:cNvSpPr>
+            <a:spLocks noGrp="1"/>
+          </p:cNvSpPr>
+          <p:nvPr>
+            <p:ph type="body" idx="1"/>
+          </p:nvPr>
+        </p:nvSpPr>
+        <p:spPr>
+          <a:xfrm>
+            <a:off x="1729999" y="1854740"/>
+            <a:ext cx="10209081" cy="2866417"/>
+          </a:xfrm>
+        </p:spPr>
+        <p:txBody>
+          <a:bodyPr/>
+          <a:lstStyle/>
+          <a:p>
+            <a:r>
+              <a:rPr lang="en-US" dirty="0"/>
+              <a:t>Let's understand the above log message. </a:t>
+            </a:r>
+          </a:p>
+          <a:p>
+            <a:r>
+              <a:rPr lang="en-US" dirty="0"/>
+              <a:t>Here, we logged information using the </a:t>
+            </a:r>
+            <a:r>
+              <a:rPr lang="en-US" dirty="0" err="1"/>
+              <a:t>LogInformation</a:t>
+            </a:r>
+            <a:r>
+              <a:rPr lang="en-US" dirty="0"/>
+              <a:t>() method, so it starts with "info:" followed by the fully qualified name of the class where a log is created: </a:t>
+            </a:r>
+            <a:r>
+              <a:rPr lang="en-US" dirty="0" err="1"/>
+              <a:t>AspDoteNetCoreMvcApp.Controllers.HomeController</a:t>
+            </a:r>
+            <a:r>
+              <a:rPr lang="en-US" dirty="0"/>
+              <a:t>[0]. </a:t>
+            </a:r>
+          </a:p>
+          <a:p>
+            <a:r>
+              <a:rPr lang="en-US" dirty="0"/>
+              <a:t>[0] is the event id. You can specify this event id to identify a record, e.g. Id, page number or other important information which uniquely identifies a log. </a:t>
+            </a:r>
+          </a:p>
+          <a:p>
+            <a:r>
+              <a:rPr lang="en-US" dirty="0"/>
+              <a:t>We didn't specify any event id, so it will be 0. </a:t>
+            </a:r>
+          </a:p>
+          <a:p>
+            <a:r>
+              <a:rPr lang="en-US" dirty="0"/>
+              <a:t>The next line is an actual log message: "Log message in the Index() method".</a:t>
+            </a:r>
+          </a:p>
+          <a:p>
+            <a:endParaRPr lang="en-US" dirty="0"/>
+          </a:p>
+          <a:p>
+            <a:pPr marL="120650" indent="0">
+              <a:buNone/>
+            </a:pPr>
+            <a:r>
+              <a:rPr lang="en-US" dirty="0"/>
+              <a:t>The same can be achieved by passing </a:t>
+            </a:r>
+            <a:r>
+              <a:rPr lang="en-US" dirty="0" err="1"/>
+              <a:t>ILoggerFactory</a:t>
+            </a:r>
+            <a:r>
+              <a:rPr lang="en-US" dirty="0"/>
+              <a:t> in the constructor.</a:t>
+            </a:r>
+            <a:endParaRPr lang="bg-BG" dirty="0"/>
+          </a:p>
+        </p:txBody>
+      </p:sp>
+      <p:pic>
+        <p:nvPicPr>
+          <p:cNvPr id="5" name="Picture 4">
+            <a:extLst>
+              <a:ext uri="{FF2B5EF4-FFF2-40B4-BE49-F238E27FC236}">
+                <a16:creationId xmlns:a16="http://schemas.microsoft.com/office/drawing/2014/main" id="{E4639C62-85DF-42E9-AB34-14704CBD31FB}"/>
+              </a:ext>
+            </a:extLst>
+          </p:cNvPr>
+          <p:cNvPicPr>
+            <a:picLocks noChangeAspect="1"/>
+          </p:cNvPicPr>
+          <p:nvPr/>
+        </p:nvPicPr>
+        <p:blipFill>
+          <a:blip r:embed="rId2"/>
+          <a:stretch>
+            <a:fillRect/>
+          </a:stretch>
+        </p:blipFill>
+        <p:spPr>
+          <a:xfrm>
+            <a:off x="1729999" y="684382"/>
+            <a:ext cx="7334250" cy="1076325"/>
+          </a:xfrm>
+          <a:prstGeom prst="rect">
+            <a:avLst/>
+          </a:prstGeom>
+        </p:spPr>
+      </p:pic>
+      <p:pic>
+        <p:nvPicPr>
+          <p:cNvPr id="8" name="Picture 7">
+            <a:extLst>
+              <a:ext uri="{FF2B5EF4-FFF2-40B4-BE49-F238E27FC236}">
+                <a16:creationId xmlns:a16="http://schemas.microsoft.com/office/drawing/2014/main" id="{298C30A4-AEBE-4DDD-93DF-A2E9138342BD}"/>
+              </a:ext>
+            </a:extLst>
+          </p:cNvPr>
+          <p:cNvPicPr>
+            <a:picLocks noChangeAspect="1"/>
+          </p:cNvPicPr>
+          <p:nvPr/>
+        </p:nvPicPr>
+        <p:blipFill>
+          <a:blip r:embed="rId3"/>
+          <a:stretch>
+            <a:fillRect/>
+          </a:stretch>
+        </p:blipFill>
+        <p:spPr>
+          <a:xfrm>
+            <a:off x="1997865" y="5083468"/>
+            <a:ext cx="4733675" cy="1249532"/>
+          </a:xfrm>
+          <a:prstGeom prst="rect">
+            <a:avLst/>
+          </a:prstGeom>
+        </p:spPr>
+      </p:pic>
+    </p:spTree>
+    <p:extLst>
+      <p:ext uri="{BB962C8B-B14F-4D97-AF65-F5344CB8AC3E}">
+        <p14:creationId xmlns:p14="http://schemas.microsoft.com/office/powerpoint/2010/main" val="3666661842"/>
+      </p:ext>
+    </p:extLst>
+  </p:cSld>
+  <p:clrMapOvr>
+    <a:masterClrMapping/>
+  </p:clrMapOvr>
+</p:sld>
+</file>
+
+<file path=ppt/slides/slide87.xml><?xml version="1.0" encoding="utf-8"?>
+<p:sld xmlns:a="http://schemas.openxmlformats.org/drawingml/2006/main" xmlns:r="http://schemas.openxmlformats.org/officeDocument/2006/relationships" xmlns:p="http://schemas.openxmlformats.org/presentationml/2006/main">
+  <p:cSld>
+    <p:spTree>
+      <p:nvGrpSpPr>
+        <p:cNvPr id="1" name=""/>
+        <p:cNvGrpSpPr/>
+        <p:nvPr/>
+      </p:nvGrpSpPr>
+      <p:grpSpPr>
+        <a:xfrm>
+          <a:off x="0" y="0"/>
+          <a:ext cx="0" cy="0"/>
+          <a:chOff x="0" y="0"/>
+          <a:chExt cx="0" cy="0"/>
+        </a:xfrm>
+      </p:grpSpPr>
+      <p:sp>
+        <p:nvSpPr>
+          <p:cNvPr id="2" name="Title 1">
+            <a:extLst>
+              <a:ext uri="{FF2B5EF4-FFF2-40B4-BE49-F238E27FC236}">
+                <a16:creationId xmlns:a16="http://schemas.microsoft.com/office/drawing/2014/main" id="{10E0DAA9-0199-494C-9E89-ACFF7424F028}"/>
+              </a:ext>
+            </a:extLst>
+          </p:cNvPr>
+          <p:cNvSpPr>
+            <a:spLocks noGrp="1"/>
+          </p:cNvSpPr>
+          <p:nvPr>
+            <p:ph type="title"/>
+          </p:nvPr>
+        </p:nvSpPr>
+        <p:spPr/>
+        <p:txBody>
+          <a:bodyPr/>
+          <a:lstStyle/>
+          <a:p>
+            <a:r>
+              <a:rPr lang="en-US" dirty="0"/>
+              <a:t>References</a:t>
+            </a:r>
+            <a:br>
+              <a:rPr lang="en-US" dirty="0"/>
+            </a:br>
+            <a:endParaRPr lang="bg-BG" dirty="0"/>
+          </a:p>
+        </p:txBody>
+      </p:sp>
+      <p:sp>
+        <p:nvSpPr>
+          <p:cNvPr id="3" name="Text Placeholder 2">
+            <a:extLst>
+              <a:ext uri="{FF2B5EF4-FFF2-40B4-BE49-F238E27FC236}">
+                <a16:creationId xmlns:a16="http://schemas.microsoft.com/office/drawing/2014/main" id="{E14B88FA-6628-4ECF-83D0-32C8AB046F2F}"/>
+              </a:ext>
+            </a:extLst>
+          </p:cNvPr>
+          <p:cNvSpPr>
+            <a:spLocks noGrp="1"/>
+          </p:cNvSpPr>
+          <p:nvPr>
+            <p:ph type="body" idx="1"/>
+          </p:nvPr>
+        </p:nvSpPr>
+        <p:spPr/>
+        <p:txBody>
+          <a:bodyPr/>
+          <a:lstStyle/>
+          <a:p>
+            <a:r>
+              <a:rPr lang="en-US" dirty="0">
+                <a:hlinkClick r:id="rId2"/>
+              </a:rPr>
+              <a:t>https://www.tutorialsteacher.com/core</a:t>
+            </a:r>
+            <a:endParaRPr lang="en-US" dirty="0"/>
+          </a:p>
+          <a:p>
+            <a:endParaRPr lang="en-US" dirty="0"/>
+          </a:p>
+          <a:p>
+            <a:r>
+              <a:rPr lang="en-US" dirty="0">
+                <a:hlinkClick r:id="rId3"/>
+              </a:rPr>
+              <a:t>https://www.tutorialsteacher.com/ioc</a:t>
+            </a:r>
+            <a:endParaRPr lang="en-US" dirty="0"/>
+          </a:p>
+          <a:p>
+            <a:endParaRPr lang="en-US" dirty="0"/>
+          </a:p>
+          <a:p>
+            <a:r>
+              <a:rPr lang="en-US" dirty="0">
+                <a:hlinkClick r:id="rId4"/>
+              </a:rPr>
+              <a:t>https://www.tutorialspoint.com/asp.net_core/index.htm</a:t>
+            </a:r>
+            <a:endParaRPr lang="en-US" dirty="0"/>
+          </a:p>
+          <a:p>
+            <a:endParaRPr lang="en-US" dirty="0"/>
+          </a:p>
+          <a:p>
+            <a:r>
+              <a:rPr lang="en-US" dirty="0">
+                <a:hlinkClick r:id="rId5"/>
+              </a:rPr>
+              <a:t>https://docs.microsoft.com/en-us/aspnet/core/tutorials/first-mvc-app/start-mvc</a:t>
+            </a:r>
+            <a:r>
+              <a:rPr lang="en-US" dirty="0"/>
+              <a:t> </a:t>
+            </a:r>
+          </a:p>
+          <a:p>
+            <a:endParaRPr lang="en-US" dirty="0"/>
+          </a:p>
+          <a:p>
+            <a:r>
+              <a:rPr lang="en-US" dirty="0">
+                <a:hlinkClick r:id="rId6"/>
+              </a:rPr>
+              <a:t>https://docs.microsoft.com/en-us/aspnet/core/fundamentals/logging</a:t>
+            </a:r>
+            <a:r>
+              <a:rPr lang="en-US" dirty="0"/>
+              <a:t> </a:t>
+            </a:r>
+            <a:endParaRPr lang="bg-BG" dirty="0"/>
+          </a:p>
+        </p:txBody>
+      </p:sp>
+    </p:spTree>
+    <p:extLst>
+      <p:ext uri="{BB962C8B-B14F-4D97-AF65-F5344CB8AC3E}">
+        <p14:creationId xmlns:p14="http://schemas.microsoft.com/office/powerpoint/2010/main" val="2545040170"/>
+      </p:ext>
+    </p:extLst>
+  </p:cSld>
+  <p:clrMapOvr>
+    <a:masterClrMapping/>
+  </p:clrMapOvr>
+</p:sld>
+</file>
+
+<file path=ppt/slides/slide88.xml><?xml version="1.0" encoding="utf-8"?>
+<p:sld xmlns:a="http://schemas.openxmlformats.org/drawingml/2006/main" xmlns:r="http://schemas.openxmlformats.org/officeDocument/2006/relationships" xmlns:p="http://schemas.openxmlformats.org/presentationml/2006/main">
+  <p:cSld>
+    <p:spTree>
+      <p:nvGrpSpPr>
+        <p:cNvPr id="1" name=""/>
+        <p:cNvGrpSpPr/>
+        <p:nvPr/>
+      </p:nvGrpSpPr>
+      <p:grpSpPr>
+        <a:xfrm>
+          <a:off x="0" y="0"/>
+          <a:ext cx="0" cy="0"/>
+          <a:chOff x="0" y="0"/>
+          <a:chExt cx="0" cy="0"/>
+        </a:xfrm>
+      </p:grpSpPr>
+      <p:sp>
+        <p:nvSpPr>
+          <p:cNvPr id="2" name="Title 1">
+            <a:extLst>
+              <a:ext uri="{FF2B5EF4-FFF2-40B4-BE49-F238E27FC236}">
+                <a16:creationId xmlns:a16="http://schemas.microsoft.com/office/drawing/2014/main" id="{047A5BB5-3F10-4F03-9744-321F834641BA}"/>
+              </a:ext>
+            </a:extLst>
+          </p:cNvPr>
+          <p:cNvSpPr>
+            <a:spLocks noGrp="1"/>
+          </p:cNvSpPr>
+          <p:nvPr>
+            <p:ph type="title"/>
+          </p:nvPr>
+        </p:nvSpPr>
+        <p:spPr/>
+        <p:txBody>
+          <a:bodyPr/>
+          <a:lstStyle/>
+          <a:p>
+            <a:r>
+              <a:rPr lang="en-US" dirty="0"/>
+              <a:t>Homework – Custom Logger Service</a:t>
+            </a:r>
+            <a:endParaRPr lang="bg-BG" dirty="0"/>
+          </a:p>
+        </p:txBody>
+      </p:sp>
+      <p:sp>
+        <p:nvSpPr>
+          <p:cNvPr id="3" name="Text Placeholder 2">
+            <a:extLst>
+              <a:ext uri="{FF2B5EF4-FFF2-40B4-BE49-F238E27FC236}">
+                <a16:creationId xmlns:a16="http://schemas.microsoft.com/office/drawing/2014/main" id="{3A1E41A4-8588-44BC-B023-FD2650C44621}"/>
+              </a:ext>
+            </a:extLst>
+          </p:cNvPr>
+          <p:cNvSpPr>
+            <a:spLocks noGrp="1"/>
+          </p:cNvSpPr>
+          <p:nvPr>
+            <p:ph type="body" idx="1"/>
+          </p:nvPr>
+        </p:nvSpPr>
+        <p:spPr>
+          <a:xfrm>
+            <a:off x="1730000" y="1446179"/>
+            <a:ext cx="9385200" cy="5181600"/>
+          </a:xfrm>
+        </p:spPr>
+        <p:txBody>
+          <a:bodyPr/>
+          <a:lstStyle/>
+          <a:p>
+            <a:r>
+              <a:rPr lang="en-US" dirty="0"/>
+              <a:t>Create new ASP.NET Core MVC web project using the default template</a:t>
+            </a:r>
+            <a:endParaRPr lang="bg-BG" dirty="0"/>
+          </a:p>
+          <a:p>
+            <a:endParaRPr lang="en-US" dirty="0"/>
+          </a:p>
+          <a:p>
+            <a:r>
+              <a:rPr lang="en-US" dirty="0"/>
+              <a:t>Create </a:t>
+            </a:r>
+            <a:r>
+              <a:rPr lang="en-US" dirty="0" err="1"/>
+              <a:t>ILoggerService</a:t>
+            </a:r>
+            <a:r>
+              <a:rPr lang="en-US" dirty="0"/>
+              <a:t> interface and </a:t>
+            </a:r>
+            <a:r>
+              <a:rPr lang="en-US" dirty="0" err="1"/>
+              <a:t>LoggerService</a:t>
+            </a:r>
+            <a:r>
+              <a:rPr lang="en-US" dirty="0"/>
+              <a:t> with methods allowing log into log file</a:t>
+            </a:r>
+          </a:p>
+          <a:p>
+            <a:endParaRPr lang="en-US" dirty="0"/>
+          </a:p>
+          <a:p>
+            <a:r>
+              <a:rPr lang="en-US" dirty="0"/>
+              <a:t>Log file format should be CSV and to contain the following information</a:t>
+            </a:r>
+          </a:p>
+          <a:p>
+            <a:pPr lvl="1">
+              <a:spcBef>
+                <a:spcPts val="0"/>
+              </a:spcBef>
+            </a:pPr>
+            <a:r>
+              <a:rPr lang="en-US" dirty="0"/>
+              <a:t>Date</a:t>
+            </a:r>
+          </a:p>
+          <a:p>
+            <a:pPr lvl="1">
+              <a:spcBef>
+                <a:spcPts val="0"/>
+              </a:spcBef>
+            </a:pPr>
+            <a:r>
+              <a:rPr lang="en-US" dirty="0"/>
+              <a:t>Time</a:t>
+            </a:r>
+          </a:p>
+          <a:p>
+            <a:pPr lvl="1">
+              <a:spcBef>
+                <a:spcPts val="0"/>
+              </a:spcBef>
+            </a:pPr>
+            <a:r>
+              <a:rPr lang="en-US" dirty="0" err="1"/>
+              <a:t>LogLevel</a:t>
+            </a:r>
+            <a:r>
+              <a:rPr lang="en-US" dirty="0"/>
+              <a:t> (</a:t>
+            </a:r>
+            <a:r>
+              <a:rPr lang="en-US" dirty="0" err="1"/>
+              <a:t>enum</a:t>
+            </a:r>
+            <a:r>
+              <a:rPr lang="en-US" dirty="0"/>
+              <a:t> - Info, Warning, Error, Critical)</a:t>
+            </a:r>
+          </a:p>
+          <a:p>
+            <a:pPr lvl="1">
+              <a:spcBef>
+                <a:spcPts val="0"/>
+              </a:spcBef>
+            </a:pPr>
+            <a:r>
+              <a:rPr lang="en-US" dirty="0"/>
+              <a:t>Error message</a:t>
+            </a:r>
+          </a:p>
+          <a:p>
+            <a:pPr lvl="1">
+              <a:spcBef>
+                <a:spcPts val="0"/>
+              </a:spcBef>
+            </a:pPr>
+            <a:endParaRPr lang="en-US" dirty="0"/>
+          </a:p>
+          <a:p>
+            <a:r>
+              <a:rPr lang="en-US" dirty="0"/>
+              <a:t>Inject and implement </a:t>
+            </a:r>
+            <a:r>
+              <a:rPr lang="en-US" dirty="0" err="1"/>
+              <a:t>LoggerService</a:t>
+            </a:r>
+            <a:r>
+              <a:rPr lang="en-US" dirty="0"/>
+              <a:t> to log exceptions in the controller</a:t>
+            </a:r>
+          </a:p>
+        </p:txBody>
+      </p:sp>
+    </p:spTree>
+    <p:extLst>
+      <p:ext uri="{BB962C8B-B14F-4D97-AF65-F5344CB8AC3E}">
+        <p14:creationId xmlns:p14="http://schemas.microsoft.com/office/powerpoint/2010/main" val="3650269123"/>
       </p:ext>
     </p:extLst>
   </p:cSld>

</xml_diff>